<commit_message>
Compositional Invariance added to poster
</commit_message>
<xml_diff>
--- a/LaRoche_CoDaWork2017_Poster.pptx
+++ b/LaRoche_CoDaWork2017_Poster.pptx
@@ -104,7 +104,16 @@
       </a:defRPr>
     </a:lvl9pPr>
   </p:defaultTextStyle>
+  <p:extLst>
+    <p:ext uri="{EFAFB233-063F-42B5-8137-9DF3F51BA10A}">
+      <p15:sldGuideLst xmlns:p15="http://schemas.microsoft.com/office/powerpoint/2012/main"/>
+    </p:ext>
+  </p:extLst>
 </p:presentation>
+</file>
+
+<file path=ppt/revisionInfo.xml><?xml version="1.0" encoding="utf-8"?>
+<p1510:revInfo xmlns:a="http://schemas.openxmlformats.org/drawingml/2006/main" xmlns:r="http://schemas.openxmlformats.org/officeDocument/2006/relationships" xmlns:p1510="http://schemas.microsoft.com/office/powerpoint/2015/10/main"/>
 </file>
 
 <file path=ppt/slideLayouts/slideLayout1.xml><?xml version="1.0" encoding="utf-8"?>
@@ -238,7 +247,7 @@
           <a:p>
             <a:fld id="{417B607A-21E1-4CA4-BF44-865E2BD1C4B9}" type="datetimeFigureOut">
               <a:rPr lang="en-US" smtClean="0"/>
-              <a:t>5/25/2017</a:t>
+              <a:t>5/26/2017</a:t>
             </a:fld>
             <a:endParaRPr lang="en-US"/>
           </a:p>
@@ -408,7 +417,7 @@
           <a:p>
             <a:fld id="{417B607A-21E1-4CA4-BF44-865E2BD1C4B9}" type="datetimeFigureOut">
               <a:rPr lang="en-US" smtClean="0"/>
-              <a:t>5/25/2017</a:t>
+              <a:t>5/26/2017</a:t>
             </a:fld>
             <a:endParaRPr lang="en-US"/>
           </a:p>
@@ -588,7 +597,7 @@
           <a:p>
             <a:fld id="{417B607A-21E1-4CA4-BF44-865E2BD1C4B9}" type="datetimeFigureOut">
               <a:rPr lang="en-US" smtClean="0"/>
-              <a:t>5/25/2017</a:t>
+              <a:t>5/26/2017</a:t>
             </a:fld>
             <a:endParaRPr lang="en-US"/>
           </a:p>
@@ -758,7 +767,7 @@
           <a:p>
             <a:fld id="{417B607A-21E1-4CA4-BF44-865E2BD1C4B9}" type="datetimeFigureOut">
               <a:rPr lang="en-US" smtClean="0"/>
-              <a:t>5/25/2017</a:t>
+              <a:t>5/26/2017</a:t>
             </a:fld>
             <a:endParaRPr lang="en-US"/>
           </a:p>
@@ -1002,7 +1011,7 @@
           <a:p>
             <a:fld id="{417B607A-21E1-4CA4-BF44-865E2BD1C4B9}" type="datetimeFigureOut">
               <a:rPr lang="en-US" smtClean="0"/>
-              <a:t>5/25/2017</a:t>
+              <a:t>5/26/2017</a:t>
             </a:fld>
             <a:endParaRPr lang="en-US"/>
           </a:p>
@@ -1234,7 +1243,7 @@
           <a:p>
             <a:fld id="{417B607A-21E1-4CA4-BF44-865E2BD1C4B9}" type="datetimeFigureOut">
               <a:rPr lang="en-US" smtClean="0"/>
-              <a:t>5/25/2017</a:t>
+              <a:t>5/26/2017</a:t>
             </a:fld>
             <a:endParaRPr lang="en-US"/>
           </a:p>
@@ -1601,7 +1610,7 @@
           <a:p>
             <a:fld id="{417B607A-21E1-4CA4-BF44-865E2BD1C4B9}" type="datetimeFigureOut">
               <a:rPr lang="en-US" smtClean="0"/>
-              <a:t>5/25/2017</a:t>
+              <a:t>5/26/2017</a:t>
             </a:fld>
             <a:endParaRPr lang="en-US"/>
           </a:p>
@@ -1719,7 +1728,7 @@
           <a:p>
             <a:fld id="{417B607A-21E1-4CA4-BF44-865E2BD1C4B9}" type="datetimeFigureOut">
               <a:rPr lang="en-US" smtClean="0"/>
-              <a:t>5/25/2017</a:t>
+              <a:t>5/26/2017</a:t>
             </a:fld>
             <a:endParaRPr lang="en-US"/>
           </a:p>
@@ -1814,7 +1823,7 @@
           <a:p>
             <a:fld id="{417B607A-21E1-4CA4-BF44-865E2BD1C4B9}" type="datetimeFigureOut">
               <a:rPr lang="en-US" smtClean="0"/>
-              <a:t>5/25/2017</a:t>
+              <a:t>5/26/2017</a:t>
             </a:fld>
             <a:endParaRPr lang="en-US"/>
           </a:p>
@@ -2091,7 +2100,7 @@
           <a:p>
             <a:fld id="{417B607A-21E1-4CA4-BF44-865E2BD1C4B9}" type="datetimeFigureOut">
               <a:rPr lang="en-US" smtClean="0"/>
-              <a:t>5/25/2017</a:t>
+              <a:t>5/26/2017</a:t>
             </a:fld>
             <a:endParaRPr lang="en-US"/>
           </a:p>
@@ -2348,7 +2357,7 @@
           <a:p>
             <a:fld id="{417B607A-21E1-4CA4-BF44-865E2BD1C4B9}" type="datetimeFigureOut">
               <a:rPr lang="en-US" smtClean="0"/>
-              <a:t>5/25/2017</a:t>
+              <a:t>5/26/2017</a:t>
             </a:fld>
             <a:endParaRPr lang="en-US"/>
           </a:p>
@@ -2561,7 +2570,7 @@
           <a:p>
             <a:fld id="{417B607A-21E1-4CA4-BF44-865E2BD1C4B9}" type="datetimeFigureOut">
               <a:rPr lang="en-US" smtClean="0"/>
-              <a:t>5/25/2017</a:t>
+              <a:t>5/26/2017</a:t>
             </a:fld>
             <a:endParaRPr lang="en-US"/>
           </a:p>
@@ -3870,7 +3879,7 @@
             <p:spPr>
               <a:xfrm>
                 <a:off x="15077274" y="5313319"/>
-                <a:ext cx="12231974" cy="14167212"/>
+                <a:ext cx="12231974" cy="11088356"/>
               </a:xfrm>
               <a:prstGeom prst="rect">
                 <a:avLst/>
@@ -4179,10 +4188,11 @@
                 </a:pPr>
                 <a:r>
                   <a:rPr lang="en-US" sz="3600" dirty="0"/>
-                  <a:t>Account for geometry when measuring distance</a:t>
+                  <a:t>Account for geometry when measuring distance, Aitchison distance</a:t>
                 </a:r>
               </a:p>
               <a:p>
+                <a:pPr/>
                 <a14:m>
                   <m:oMathPara xmlns:m="http://schemas.openxmlformats.org/officeDocument/2006/math">
                     <m:oMathParaPr>
@@ -4504,24 +4514,6 @@
                 </a14:m>
                 <a:endParaRPr lang="en-US" sz="3600" b="1" dirty="0"/>
               </a:p>
-              <a:p>
-                <a:endParaRPr lang="en-US" sz="3600" b="1" dirty="0"/>
-              </a:p>
-              <a:p>
-                <a:endParaRPr lang="en-US" sz="3600" dirty="0"/>
-              </a:p>
-              <a:p>
-                <a:endParaRPr lang="en-US" sz="3600" dirty="0"/>
-              </a:p>
-              <a:p>
-                <a:endParaRPr lang="en-US" sz="3600" dirty="0"/>
-              </a:p>
-              <a:p>
-                <a:endParaRPr lang="en-US" sz="3600" dirty="0"/>
-              </a:p>
-              <a:p>
-                <a:endParaRPr lang="en-US" sz="3600" dirty="0"/>
-              </a:p>
             </p:txBody>
           </p:sp>
         </mc:Choice>
@@ -4543,7 +4535,7 @@
             <p:spPr>
               <a:xfrm>
                 <a:off x="15077274" y="5313319"/>
-                <a:ext cx="12231974" cy="14167212"/>
+                <a:ext cx="12231974" cy="11088356"/>
               </a:xfrm>
               <a:prstGeom prst="rect">
                 <a:avLst/>
@@ -4551,7 +4543,7 @@
               <a:blipFill>
                 <a:blip r:embed="rId4"/>
                 <a:stretch>
-                  <a:fillRect l="-1495" t="-688" r="-747"/>
+                  <a:fillRect l="-1495" t="-880" r="-747"/>
                 </a:stretch>
               </a:blipFill>
             </p:spPr>
@@ -4570,8 +4562,8 @@
           </p:sp>
         </mc:Fallback>
       </mc:AlternateContent>
-      <mc:AlternateContent xmlns:mc="http://schemas.openxmlformats.org/markup-compatibility/2006">
-        <mc:Choice xmlns:a14="http://schemas.microsoft.com/office/drawing/2010/main" Requires="a14">
+      <mc:AlternateContent xmlns:mc="http://schemas.openxmlformats.org/markup-compatibility/2006" xmlns:a14="http://schemas.microsoft.com/office/drawing/2010/main">
+        <mc:Choice Requires="a14">
           <p:sp>
             <p:nvSpPr>
               <p:cNvPr id="27" name="TextBox 26">
@@ -4780,7 +4772,7 @@
             </p:txBody>
           </p:sp>
         </mc:Choice>
-        <mc:Fallback>
+        <mc:Fallback xmlns="">
           <p:sp>
             <p:nvSpPr>
               <p:cNvPr id="27" name="TextBox 26">
@@ -4954,6 +4946,227 @@
               <a:rPr lang="en-US" sz="2200" dirty="0"/>
               <a:t>The raw (left) and CLR transformed (right) total counts for 120 mRNA samples sequenced in 5 runs.  The CLR transformation substantially improves the detection of low total count outlying samples.</a:t>
             </a:r>
+          </a:p>
+        </p:txBody>
+      </p:sp>
+      <p:sp>
+        <p:nvSpPr>
+          <p:cNvPr id="2" name="TextBox 1">
+            <a:extLst>
+              <a:ext uri="{FF2B5EF4-FFF2-40B4-BE49-F238E27FC236}">
+                <a16:creationId xmlns:a16="http://schemas.microsoft.com/office/drawing/2014/main" id="{BEB01097-9A6F-4BAD-ABEC-BB35033BB7AF}"/>
+              </a:ext>
+            </a:extLst>
+          </p:cNvPr>
+          <p:cNvSpPr txBox="1"/>
+          <p:nvPr/>
+        </p:nvSpPr>
+        <p:spPr>
+          <a:xfrm>
+            <a:off x="727868" y="18554700"/>
+            <a:ext cx="12683332" cy="5509200"/>
+          </a:xfrm>
+          <a:prstGeom prst="rect">
+            <a:avLst/>
+          </a:prstGeom>
+          <a:noFill/>
+        </p:spPr>
+        <p:txBody>
+          <a:bodyPr wrap="square" rtlCol="0">
+            <a:spAutoFit/>
+          </a:bodyPr>
+          <a:lstStyle/>
+          <a:p>
+            <a:r>
+              <a:rPr lang="en-US" sz="3200" dirty="0"/>
+              <a:t>Analytical methods for  RNA-</a:t>
+            </a:r>
+            <a:r>
+              <a:rPr lang="en-US" sz="3200" dirty="0" err="1"/>
+              <a:t>Seq</a:t>
+            </a:r>
+            <a:r>
+              <a:rPr lang="en-US" sz="3200" dirty="0"/>
+              <a:t> assume that the total number of reads assigned to a sample is independent of the relative abundance of probes in the sample, this is referred to as Compositional Invariance (CI).  However, insufficient availability of probes may lead to violations of CI.  We provide a visualization for evaluating CI in a sequencing run.</a:t>
+            </a:r>
+          </a:p>
+          <a:p>
+            <a:endParaRPr lang="en-US" sz="3200" dirty="0"/>
+          </a:p>
+          <a:p>
+            <a:r>
+              <a:rPr lang="en-US" sz="3200" b="1" dirty="0"/>
+              <a:t>Method: </a:t>
+            </a:r>
+          </a:p>
+          <a:p>
+            <a:pPr marL="514350" indent="-514350">
+              <a:buFont typeface="+mj-lt"/>
+              <a:buAutoNum type="arabicPeriod"/>
+            </a:pPr>
+            <a:r>
+              <a:rPr lang="en-US" sz="3200" dirty="0"/>
+              <a:t>Calculate all pairwise distances using Aitchison Distance</a:t>
+            </a:r>
+          </a:p>
+          <a:p>
+            <a:pPr marL="514350" indent="-514350">
+              <a:buFont typeface="+mj-lt"/>
+              <a:buAutoNum type="arabicPeriod"/>
+            </a:pPr>
+            <a:r>
+              <a:rPr lang="en-US" sz="3200" dirty="0"/>
+              <a:t>Create heatmap of distances with samples ordered by total reads</a:t>
+            </a:r>
+          </a:p>
+          <a:p>
+            <a:pPr marL="514350" indent="-514350">
+              <a:buFont typeface="+mj-lt"/>
+              <a:buAutoNum type="arabicPeriod"/>
+            </a:pPr>
+            <a:r>
+              <a:rPr lang="en-US" sz="3200" dirty="0"/>
+              <a:t>Plot multi-variate distance between each sample and the center of the top 25% of samples with respect to total reads</a:t>
+            </a:r>
+          </a:p>
+        </p:txBody>
+      </p:sp>
+      <p:pic>
+        <p:nvPicPr>
+          <p:cNvPr id="6" name="Picture 5">
+            <a:extLst>
+              <a:ext uri="{FF2B5EF4-FFF2-40B4-BE49-F238E27FC236}">
+                <a16:creationId xmlns:a16="http://schemas.microsoft.com/office/drawing/2014/main" id="{AB9DFE89-EED4-42AF-B658-D15E500BA8C1}"/>
+              </a:ext>
+            </a:extLst>
+          </p:cNvPr>
+          <p:cNvPicPr>
+            <a:picLocks noChangeAspect="1"/>
+          </p:cNvPicPr>
+          <p:nvPr/>
+        </p:nvPicPr>
+        <p:blipFill>
+          <a:blip r:embed="rId8">
+            <a:extLst>
+              <a:ext uri="{28A0092B-C50C-407E-A947-70E740481C1C}">
+                <a14:useLocalDpi xmlns:a14="http://schemas.microsoft.com/office/drawing/2010/main" val="0"/>
+              </a:ext>
+            </a:extLst>
+          </a:blip>
+          <a:stretch>
+            <a:fillRect/>
+          </a:stretch>
+        </p:blipFill>
+        <p:spPr>
+          <a:xfrm>
+            <a:off x="937409" y="24063900"/>
+            <a:ext cx="4396591" cy="4396591"/>
+          </a:xfrm>
+          <a:prstGeom prst="rect">
+            <a:avLst/>
+          </a:prstGeom>
+        </p:spPr>
+      </p:pic>
+      <p:sp>
+        <p:nvSpPr>
+          <p:cNvPr id="7" name="TextBox 6">
+            <a:extLst>
+              <a:ext uri="{FF2B5EF4-FFF2-40B4-BE49-F238E27FC236}">
+                <a16:creationId xmlns:a16="http://schemas.microsoft.com/office/drawing/2014/main" id="{33ACBAC5-6B78-49ED-AABA-43E3A235C19F}"/>
+              </a:ext>
+            </a:extLst>
+          </p:cNvPr>
+          <p:cNvSpPr txBox="1"/>
+          <p:nvPr/>
+        </p:nvSpPr>
+        <p:spPr>
+          <a:xfrm flipH="1">
+            <a:off x="5900609" y="24306663"/>
+            <a:ext cx="7296776" cy="2246769"/>
+          </a:xfrm>
+          <a:prstGeom prst="rect">
+            <a:avLst/>
+          </a:prstGeom>
+          <a:noFill/>
+        </p:spPr>
+        <p:txBody>
+          <a:bodyPr wrap="square" rtlCol="0">
+            <a:spAutoFit/>
+          </a:bodyPr>
+          <a:lstStyle/>
+          <a:p>
+            <a:r>
+              <a:rPr lang="en-US" sz="2800" dirty="0"/>
+              <a:t>Figure 2. Distances between samples should be independent of the total reads assigned to each sample.  Violations of compositional invariance can be visualized through the ordering samples by total aligned reads.  </a:t>
+            </a:r>
+          </a:p>
+        </p:txBody>
+      </p:sp>
+      <p:sp>
+        <p:nvSpPr>
+          <p:cNvPr id="8" name="TextBox 7">
+            <a:extLst>
+              <a:ext uri="{FF2B5EF4-FFF2-40B4-BE49-F238E27FC236}">
+                <a16:creationId xmlns:a16="http://schemas.microsoft.com/office/drawing/2014/main" id="{896DB140-5264-4CF5-A835-A7D292B9A190}"/>
+              </a:ext>
+            </a:extLst>
+          </p:cNvPr>
+          <p:cNvSpPr txBox="1"/>
+          <p:nvPr/>
+        </p:nvSpPr>
+        <p:spPr>
+          <a:xfrm>
+            <a:off x="15024330" y="18328943"/>
+            <a:ext cx="12121067" cy="3046988"/>
+          </a:xfrm>
+          <a:prstGeom prst="rect">
+            <a:avLst/>
+          </a:prstGeom>
+          <a:noFill/>
+        </p:spPr>
+        <p:txBody>
+          <a:bodyPr wrap="square" rtlCol="0">
+            <a:spAutoFit/>
+          </a:bodyPr>
+          <a:lstStyle/>
+          <a:p>
+            <a:r>
+              <a:rPr lang="en-US" sz="3200" dirty="0"/>
+              <a:t>Identifying and controlling for batch effects is a critical step in the transition of RNA-</a:t>
+            </a:r>
+            <a:r>
+              <a:rPr lang="en-US" sz="3200" dirty="0" err="1"/>
+              <a:t>Seq</a:t>
+            </a:r>
+            <a:r>
+              <a:rPr lang="en-US" sz="3200" dirty="0"/>
+              <a:t> from the lab to the clinic. </a:t>
+            </a:r>
+          </a:p>
+          <a:p>
+            <a:pPr marL="457200" indent="-457200">
+              <a:buFont typeface="Arial" panose="020B0604020202020204" pitchFamily="34" charset="0"/>
+              <a:buChar char="•"/>
+            </a:pPr>
+            <a:r>
+              <a:rPr lang="en-US" sz="3200" dirty="0"/>
+              <a:t>Identify sample groups related to batch with a hierarchical clustering (HC) or principal components analysis (PCA) on CLR transformed counts.</a:t>
+            </a:r>
+          </a:p>
+          <a:p>
+            <a:pPr marL="457200" indent="-457200">
+              <a:buFont typeface="Arial" panose="020B0604020202020204" pitchFamily="34" charset="0"/>
+              <a:buChar char="•"/>
+            </a:pPr>
+            <a:r>
+              <a:rPr lang="en-US" sz="3200" dirty="0"/>
+              <a:t>CLR transformation </a:t>
+            </a:r>
+            <a:r>
+              <a:rPr lang="en-US" sz="3200"/>
+              <a:t>has several </a:t>
+            </a:r>
+            <a:endParaRPr lang="en-US" sz="3200" dirty="0"/>
           </a:p>
         </p:txBody>
       </p:sp>

</xml_diff>

<commit_message>
Finished first draft and sent out for review
</commit_message>
<xml_diff>
--- a/LaRoche_CoDaWork2017_Poster.pptx
+++ b/LaRoche_CoDaWork2017_Poster.pptx
@@ -247,7 +247,7 @@
           <a:p>
             <a:fld id="{417B607A-21E1-4CA4-BF44-865E2BD1C4B9}" type="datetimeFigureOut">
               <a:rPr lang="en-US" smtClean="0"/>
-              <a:t>5/26/2017</a:t>
+              <a:t>5/28/2017</a:t>
             </a:fld>
             <a:endParaRPr lang="en-US"/>
           </a:p>
@@ -417,7 +417,7 @@
           <a:p>
             <a:fld id="{417B607A-21E1-4CA4-BF44-865E2BD1C4B9}" type="datetimeFigureOut">
               <a:rPr lang="en-US" smtClean="0"/>
-              <a:t>5/26/2017</a:t>
+              <a:t>5/28/2017</a:t>
             </a:fld>
             <a:endParaRPr lang="en-US"/>
           </a:p>
@@ -597,7 +597,7 @@
           <a:p>
             <a:fld id="{417B607A-21E1-4CA4-BF44-865E2BD1C4B9}" type="datetimeFigureOut">
               <a:rPr lang="en-US" smtClean="0"/>
-              <a:t>5/26/2017</a:t>
+              <a:t>5/28/2017</a:t>
             </a:fld>
             <a:endParaRPr lang="en-US"/>
           </a:p>
@@ -767,7 +767,7 @@
           <a:p>
             <a:fld id="{417B607A-21E1-4CA4-BF44-865E2BD1C4B9}" type="datetimeFigureOut">
               <a:rPr lang="en-US" smtClean="0"/>
-              <a:t>5/26/2017</a:t>
+              <a:t>5/28/2017</a:t>
             </a:fld>
             <a:endParaRPr lang="en-US"/>
           </a:p>
@@ -1011,7 +1011,7 @@
           <a:p>
             <a:fld id="{417B607A-21E1-4CA4-BF44-865E2BD1C4B9}" type="datetimeFigureOut">
               <a:rPr lang="en-US" smtClean="0"/>
-              <a:t>5/26/2017</a:t>
+              <a:t>5/28/2017</a:t>
             </a:fld>
             <a:endParaRPr lang="en-US"/>
           </a:p>
@@ -1243,7 +1243,7 @@
           <a:p>
             <a:fld id="{417B607A-21E1-4CA4-BF44-865E2BD1C4B9}" type="datetimeFigureOut">
               <a:rPr lang="en-US" smtClean="0"/>
-              <a:t>5/26/2017</a:t>
+              <a:t>5/28/2017</a:t>
             </a:fld>
             <a:endParaRPr lang="en-US"/>
           </a:p>
@@ -1610,7 +1610,7 @@
           <a:p>
             <a:fld id="{417B607A-21E1-4CA4-BF44-865E2BD1C4B9}" type="datetimeFigureOut">
               <a:rPr lang="en-US" smtClean="0"/>
-              <a:t>5/26/2017</a:t>
+              <a:t>5/28/2017</a:t>
             </a:fld>
             <a:endParaRPr lang="en-US"/>
           </a:p>
@@ -1728,7 +1728,7 @@
           <a:p>
             <a:fld id="{417B607A-21E1-4CA4-BF44-865E2BD1C4B9}" type="datetimeFigureOut">
               <a:rPr lang="en-US" smtClean="0"/>
-              <a:t>5/26/2017</a:t>
+              <a:t>5/28/2017</a:t>
             </a:fld>
             <a:endParaRPr lang="en-US"/>
           </a:p>
@@ -1823,7 +1823,7 @@
           <a:p>
             <a:fld id="{417B607A-21E1-4CA4-BF44-865E2BD1C4B9}" type="datetimeFigureOut">
               <a:rPr lang="en-US" smtClean="0"/>
-              <a:t>5/26/2017</a:t>
+              <a:t>5/28/2017</a:t>
             </a:fld>
             <a:endParaRPr lang="en-US"/>
           </a:p>
@@ -2100,7 +2100,7 @@
           <a:p>
             <a:fld id="{417B607A-21E1-4CA4-BF44-865E2BD1C4B9}" type="datetimeFigureOut">
               <a:rPr lang="en-US" smtClean="0"/>
-              <a:t>5/26/2017</a:t>
+              <a:t>5/28/2017</a:t>
             </a:fld>
             <a:endParaRPr lang="en-US"/>
           </a:p>
@@ -2357,7 +2357,7 @@
           <a:p>
             <a:fld id="{417B607A-21E1-4CA4-BF44-865E2BD1C4B9}" type="datetimeFigureOut">
               <a:rPr lang="en-US" smtClean="0"/>
-              <a:t>5/26/2017</a:t>
+              <a:t>5/28/2017</a:t>
             </a:fld>
             <a:endParaRPr lang="en-US"/>
           </a:p>
@@ -2570,7 +2570,7 @@
           <a:p>
             <a:fld id="{417B607A-21E1-4CA4-BF44-865E2BD1C4B9}" type="datetimeFigureOut">
               <a:rPr lang="en-US" smtClean="0"/>
-              <a:t>5/26/2017</a:t>
+              <a:t>5/28/2017</a:t>
             </a:fld>
             <a:endParaRPr lang="en-US"/>
           </a:p>
@@ -3438,11 +3438,7 @@
           <a:p>
             <a:r>
               <a:rPr lang="en-US" sz="4800" b="1" dirty="0"/>
-              <a:t>Extraction-free Targeted (EFT) RNA-</a:t>
-            </a:r>
-            <a:r>
-              <a:rPr lang="en-US" sz="4800" b="1" dirty="0" err="1"/>
-              <a:t>Seq</a:t>
+              <a:t>Introduction</a:t>
             </a:r>
             <a:endParaRPr lang="en-US" sz="3200" b="1" dirty="0"/>
           </a:p>
@@ -3711,8 +3707,8 @@
         </p:nvSpPr>
         <p:spPr>
           <a:xfrm>
-            <a:off x="1295400" y="5860197"/>
-            <a:ext cx="11357768" cy="8956298"/>
+            <a:off x="937409" y="5370597"/>
+            <a:ext cx="12259976" cy="10741402"/>
           </a:xfrm>
           <a:prstGeom prst="rect">
             <a:avLst/>
@@ -3727,6 +3723,45 @@
           <a:p>
             <a:r>
               <a:rPr lang="en-US" sz="3600" dirty="0"/>
+              <a:t>We develop quality control diagnostics for extraction-free targeted RNA-</a:t>
+            </a:r>
+            <a:r>
+              <a:rPr lang="en-US" sz="3600" dirty="0" err="1"/>
+              <a:t>Seq</a:t>
+            </a:r>
+            <a:r>
+              <a:rPr lang="en-US" sz="3600" dirty="0"/>
+              <a:t> by recognizing the compositional nature of RNA-</a:t>
+            </a:r>
+            <a:r>
+              <a:rPr lang="en-US" sz="3600" dirty="0" err="1"/>
+              <a:t>Seq</a:t>
+            </a:r>
+            <a:r>
+              <a:rPr lang="en-US" sz="3600" dirty="0"/>
+              <a:t> and utilizing the existing body of work on compositional data.</a:t>
+            </a:r>
+          </a:p>
+          <a:p>
+            <a:endParaRPr lang="en-US" sz="3600" dirty="0"/>
+          </a:p>
+          <a:p>
+            <a:r>
+              <a:rPr lang="en-US" sz="3600" b="1" dirty="0"/>
+              <a:t>Extraction-free Targeted (EFT) RNA-</a:t>
+            </a:r>
+            <a:r>
+              <a:rPr lang="en-US" sz="3600" b="1" dirty="0" err="1"/>
+              <a:t>Seq</a:t>
+            </a:r>
+            <a:endParaRPr lang="en-US" sz="2000" b="1" dirty="0"/>
+          </a:p>
+          <a:p>
+            <a:endParaRPr lang="en-US" sz="2000" dirty="0"/>
+          </a:p>
+          <a:p>
+            <a:r>
+              <a:rPr lang="en-US" sz="3600" dirty="0"/>
               <a:t>EFT RNA-</a:t>
             </a:r>
             <a:r>
@@ -3787,32 +3822,38 @@
             </a:r>
           </a:p>
           <a:p>
+            <a:endParaRPr lang="en-US" sz="2400" dirty="0"/>
+          </a:p>
+          <a:p>
+            <a:r>
+              <a:rPr lang="en-US" sz="3600" dirty="0"/>
+              <a:t>EFT RNA-</a:t>
+            </a:r>
+            <a:r>
+              <a:rPr lang="en-US" sz="3600" dirty="0" err="1"/>
+              <a:t>Seq</a:t>
+            </a:r>
+            <a:r>
+              <a:rPr lang="en-US" sz="3600" dirty="0"/>
+              <a:t> creates the need for </a:t>
+            </a:r>
+            <a:r>
+              <a:rPr lang="en-US" sz="3600" dirty="0" err="1"/>
+              <a:t>pos</a:t>
+            </a:r>
+            <a:r>
+              <a:rPr lang="en-US" sz="3600" dirty="0"/>
+              <a:t>-sequencing quality control metrics.</a:t>
+            </a:r>
+          </a:p>
+          <a:p>
             <a:pPr marL="571500" indent="-571500">
               <a:buFont typeface="Arial" panose="020B0604020202020204" pitchFamily="34" charset="0"/>
               <a:buChar char="•"/>
             </a:pPr>
-            <a:endParaRPr lang="en-US" sz="3600" dirty="0"/>
-          </a:p>
-          <a:p>
             <a:r>
               <a:rPr lang="en-US" sz="3600" dirty="0"/>
-              <a:t>EFT RNA-</a:t>
-            </a:r>
-            <a:r>
-              <a:rPr lang="en-US" sz="3600" dirty="0" err="1"/>
-              <a:t>Seq</a:t>
-            </a:r>
-            <a:r>
-              <a:rPr lang="en-US" sz="3600" dirty="0"/>
-              <a:t> creates the need for </a:t>
-            </a:r>
-            <a:r>
-              <a:rPr lang="en-US" sz="3600" dirty="0" err="1"/>
-              <a:t>pos</a:t>
-            </a:r>
-            <a:r>
-              <a:rPr lang="en-US" sz="3600" dirty="0"/>
-              <a:t>-sequencing quality control metrics.</a:t>
+              <a:t>No extraction step for discovering biological samples with little or degraded RNA</a:t>
             </a:r>
           </a:p>
           <a:p>
@@ -3822,43 +3863,11 @@
             </a:pPr>
             <a:r>
               <a:rPr lang="en-US" sz="3600" dirty="0"/>
-              <a:t>No extraction step for discovering biological samples with little or degraded RNA</a:t>
-            </a:r>
-          </a:p>
-          <a:p>
-            <a:pPr marL="571500" indent="-571500">
-              <a:buFont typeface="Arial" panose="020B0604020202020204" pitchFamily="34" charset="0"/>
-              <a:buChar char="•"/>
-            </a:pPr>
-            <a:r>
-              <a:rPr lang="en-US" sz="3600" dirty="0"/>
               <a:t>No genome alignment for sequence quality assessment</a:t>
             </a:r>
           </a:p>
           <a:p>
             <a:endParaRPr lang="en-US" sz="3600" dirty="0"/>
-          </a:p>
-          <a:p>
-            <a:r>
-              <a:rPr lang="en-US" sz="3600" dirty="0"/>
-              <a:t>We develop quality control diagnostics for EFT RNA-</a:t>
-            </a:r>
-            <a:r>
-              <a:rPr lang="en-US" sz="3600" dirty="0" err="1"/>
-              <a:t>Seq</a:t>
-            </a:r>
-            <a:r>
-              <a:rPr lang="en-US" sz="3600" dirty="0"/>
-              <a:t> by recognizing the compositional nature of RNA-</a:t>
-            </a:r>
-            <a:r>
-              <a:rPr lang="en-US" sz="3600" dirty="0" err="1"/>
-              <a:t>Seq</a:t>
-            </a:r>
-            <a:r>
-              <a:rPr lang="en-US" sz="3600" dirty="0"/>
-              <a:t> and utilizing the existing body of work on compositional data.</a:t>
-            </a:r>
           </a:p>
         </p:txBody>
       </p:sp>
@@ -3879,7 +3888,7 @@
             <p:spPr>
               <a:xfrm>
                 <a:off x="15077274" y="5313319"/>
-                <a:ext cx="12231974" cy="11088356"/>
+                <a:ext cx="12231974" cy="10257360"/>
               </a:xfrm>
               <a:prstGeom prst="rect">
                 <a:avLst/>
@@ -3894,7 +3903,7 @@
               <a:p>
                 <a:r>
                   <a:rPr lang="en-US" sz="3600" dirty="0"/>
-                  <a:t>Both EFT RNA-</a:t>
+                  <a:t>RNA-</a:t>
                 </a:r>
                 <a:r>
                   <a:rPr lang="en-US" sz="3600" dirty="0" err="1"/>
@@ -3902,16 +3911,15 @@
                 </a:r>
                 <a:r>
                   <a:rPr lang="en-US" sz="3600" dirty="0"/>
-                  <a:t> and traditional RNA-</a:t>
+                  <a:t> measures relative abundances of RNA transcripts..</a:t>
                 </a:r>
-                <a:r>
-                  <a:rPr lang="en-US" sz="3600" dirty="0" err="1"/>
-                  <a:t>Seq</a:t>
-                </a:r>
-                <a:r>
-                  <a:rPr lang="en-US" sz="3600" dirty="0"/>
-                  <a:t> measure the relative abundances of RNA transcripts in a sample.	</a:t>
-                </a:r>
+              </a:p>
+              <a:p>
+                <a:pPr marL="571500" indent="-571500">
+                  <a:buFont typeface="Arial" panose="020B0604020202020204" pitchFamily="34" charset="0"/>
+                  <a:buChar char="•"/>
+                </a:pPr>
+                <a:endParaRPr lang="en-US" dirty="0"/>
               </a:p>
               <a:p>
                 <a:pPr marL="571500" indent="-571500">
@@ -3920,7 +3928,7 @@
                 </a:pPr>
                 <a:r>
                   <a:rPr lang="en-US" sz="3600" dirty="0"/>
-                  <a:t>Finite number of transcript reads (counts)</a:t>
+                  <a:t>Finite number of transcript reads (counts) per run</a:t>
                 </a:r>
               </a:p>
               <a:p>
@@ -3963,7 +3971,7 @@
               <a:p>
                 <a:r>
                   <a:rPr lang="en-US" sz="3600" dirty="0"/>
-                  <a:t>Statistical procedures must account for the special geometry induced by the total sum constraint, particularly with respect to covariance matrices and distances. </a:t>
+                  <a:t>Statistical procedures must account for the compositional geometry. </a:t>
                 </a:r>
               </a:p>
               <a:p>
@@ -3976,7 +3984,7 @@
                 </a:pPr>
                 <a:r>
                   <a:rPr lang="en-US" sz="3600" dirty="0"/>
-                  <a:t>Work in ratios of components with centered log ratio transformation</a:t>
+                  <a:t>Work in ratios of components with centered log ratio (CLR) transformation.</a:t>
                 </a:r>
               </a:p>
               <a:p>
@@ -4126,7 +4134,7 @@
               <a:p>
                 <a:r>
                   <a:rPr lang="en-US" sz="2800" dirty="0"/>
-                  <a:t>where </a:t>
+                  <a:t>		where </a:t>
                 </a:r>
                 <a14:m>
                   <m:oMath xmlns:m="http://schemas.openxmlformats.org/officeDocument/2006/math">
@@ -4188,7 +4196,7 @@
                 </a:pPr>
                 <a:r>
                   <a:rPr lang="en-US" sz="3600" dirty="0"/>
-                  <a:t>Account for geometry when measuring distance, Aitchison distance</a:t>
+                  <a:t>Account for geometry when measuring distance (Aitchison distance)</a:t>
                 </a:r>
               </a:p>
               <a:p>
@@ -4535,7 +4543,7 @@
             <p:spPr>
               <a:xfrm>
                 <a:off x="15077274" y="5313319"/>
-                <a:ext cx="12231974" cy="11088356"/>
+                <a:ext cx="12231974" cy="10257360"/>
               </a:xfrm>
               <a:prstGeom prst="rect">
                 <a:avLst/>
@@ -4543,7 +4551,7 @@
               <a:blipFill>
                 <a:blip r:embed="rId4"/>
                 <a:stretch>
-                  <a:fillRect l="-1495" t="-880" r="-747"/>
+                  <a:fillRect l="-1495" t="-951"/>
                 </a:stretch>
               </a:blipFill>
             </p:spPr>
@@ -4562,8 +4570,8 @@
           </p:sp>
         </mc:Fallback>
       </mc:AlternateContent>
-      <mc:AlternateContent xmlns:mc="http://schemas.openxmlformats.org/markup-compatibility/2006" xmlns:a14="http://schemas.microsoft.com/office/drawing/2010/main">
-        <mc:Choice Requires="a14">
+      <mc:AlternateContent xmlns:mc="http://schemas.openxmlformats.org/markup-compatibility/2006">
+        <mc:Choice xmlns:a14="http://schemas.microsoft.com/office/drawing/2010/main" Requires="a14">
           <p:sp>
             <p:nvSpPr>
               <p:cNvPr id="27" name="TextBox 26">
@@ -4578,8 +4586,8 @@
             </p:nvSpPr>
             <p:spPr>
               <a:xfrm flipH="1">
-                <a:off x="29171607" y="5711252"/>
-                <a:ext cx="12547892" cy="6247864"/>
+                <a:off x="29160107" y="5313319"/>
+                <a:ext cx="12547892" cy="6740307"/>
               </a:xfrm>
               <a:prstGeom prst="rect">
                 <a:avLst/>
@@ -4593,25 +4601,18 @@
               <a:lstStyle/>
               <a:p>
                 <a:r>
-                  <a:rPr lang="en-US" sz="3200" dirty="0"/>
+                  <a:rPr lang="en-US" sz="3600" dirty="0"/>
                   <a:t>Problems with sample quality, library preparation, or sequencing may result in a low number of reads allocated to a sample.</a:t>
                 </a:r>
               </a:p>
               <a:p>
-                <a:endParaRPr lang="en-US" sz="3200" dirty="0"/>
-              </a:p>
-              <a:p>
+                <a:pPr marL="571500" indent="-571500">
+                  <a:buFont typeface="Arial" panose="020B0604020202020204" pitchFamily="34" charset="0"/>
+                  <a:buChar char="•"/>
+                </a:pPr>
                 <a:r>
-                  <a:rPr lang="en-US" sz="3200" dirty="0"/>
-                  <a:t>We expect the number of reads allocated to each sample in a </a:t>
-                </a:r>
-                <a:r>
-                  <a:rPr lang="en-US" sz="2800" dirty="0"/>
-                  <a:t>sequencing</a:t>
-                </a:r>
-                <a:r>
-                  <a:rPr lang="en-US" sz="3200" dirty="0"/>
-                  <a:t> run to arise from the same general data generating mechanism, deviations from this expectation may indicate a sample problem.</a:t>
+                  <a:rPr lang="en-US" sz="3600" dirty="0"/>
+                  <a:t>For most experiments we expect samples to get equal allocation of sequence reads</a:t>
                 </a:r>
               </a:p>
               <a:p>
@@ -4645,6 +4646,13 @@
                 </a:r>
               </a:p>
               <a:p>
+                <a:pPr marL="742950" indent="-742950">
+                  <a:buFont typeface="+mj-lt"/>
+                  <a:buAutoNum type="arabicPeriod"/>
+                </a:pPr>
+                <a:endParaRPr lang="en-US" sz="3600" dirty="0"/>
+              </a:p>
+              <a:p>
                 <a:r>
                   <a:rPr lang="en-US" sz="3600" b="1" dirty="0"/>
                   <a:t>Definition: </a:t>
@@ -4654,14 +4662,14 @@
                     <m:sSub>
                       <m:sSubPr>
                         <m:ctrlPr>
-                          <a:rPr lang="en-US" sz="2800" i="1" smtClean="0">
+                          <a:rPr lang="en-US" sz="3600" i="1" smtClean="0">
                             <a:latin typeface="Cambria Math" panose="02040503050406030204" pitchFamily="18" charset="0"/>
                           </a:rPr>
                         </m:ctrlPr>
                       </m:sSubPr>
                       <m:e>
                         <m:r>
-                          <a:rPr lang="en-US" sz="2800" b="0" i="1" smtClean="0">
+                          <a:rPr lang="en-US" sz="3600" b="0" i="1" smtClean="0">
                             <a:latin typeface="Cambria Math" panose="02040503050406030204" pitchFamily="18" charset="0"/>
                           </a:rPr>
                           <m:t>𝑥</m:t>
@@ -4669,7 +4677,7 @@
                       </m:e>
                       <m:sub>
                         <m:r>
-                          <a:rPr lang="en-US" sz="2800" b="0" i="1" smtClean="0">
+                          <a:rPr lang="en-US" sz="3600" b="0" i="1" smtClean="0">
                             <a:latin typeface="Cambria Math" panose="02040503050406030204" pitchFamily="18" charset="0"/>
                           </a:rPr>
                           <m:t>𝑖</m:t>
@@ -4677,7 +4685,7 @@
                       </m:sub>
                     </m:sSub>
                     <m:r>
-                      <a:rPr lang="en-US" sz="2800" b="0" i="1" smtClean="0">
+                      <a:rPr lang="en-US" sz="3600" b="0" i="1" smtClean="0">
                         <a:latin typeface="Cambria Math" panose="02040503050406030204" pitchFamily="18" charset="0"/>
                       </a:rPr>
                       <m:t> </m:t>
@@ -4685,7 +4693,7 @@
                   </m:oMath>
                 </a14:m>
                 <a:r>
-                  <a:rPr lang="en-US" sz="2800" dirty="0"/>
+                  <a:rPr lang="en-US" sz="3600" dirty="0"/>
                   <a:t>is a quality control sample failure if </a:t>
                 </a:r>
                 <a14:m>
@@ -4693,14 +4701,14 @@
                     <m:sSub>
                       <m:sSubPr>
                         <m:ctrlPr>
-                          <a:rPr lang="en-US" sz="2800" i="1" smtClean="0">
+                          <a:rPr lang="en-US" sz="3600" i="1" smtClean="0">
                             <a:latin typeface="Cambria Math" panose="02040503050406030204" pitchFamily="18" charset="0"/>
                           </a:rPr>
                         </m:ctrlPr>
                       </m:sSubPr>
                       <m:e>
                         <m:r>
-                          <a:rPr lang="en-US" sz="2800" b="0" i="1" smtClean="0">
+                          <a:rPr lang="en-US" sz="3600" b="0" i="1" smtClean="0">
                             <a:latin typeface="Cambria Math" panose="02040503050406030204" pitchFamily="18" charset="0"/>
                           </a:rPr>
                           <m:t>𝑥</m:t>
@@ -4708,7 +4716,7 @@
                       </m:e>
                       <m:sub>
                         <m:r>
-                          <a:rPr lang="en-US" sz="2800" b="0" i="1" smtClean="0">
+                          <a:rPr lang="en-US" sz="3600" b="0" i="1" smtClean="0">
                             <a:latin typeface="Cambria Math" panose="02040503050406030204" pitchFamily="18" charset="0"/>
                           </a:rPr>
                           <m:t>𝑖</m:t>
@@ -4718,7 +4726,7 @@
                   </m:oMath>
                 </a14:m>
                 <a:r>
-                  <a:rPr lang="en-US" sz="2800" dirty="0"/>
+                  <a:rPr lang="en-US" sz="3600" dirty="0"/>
                   <a:t> &lt; lower-quartile - 1.5 × IQR or </a:t>
                 </a:r>
                 <a14:m>
@@ -4726,14 +4734,14 @@
                     <m:sSub>
                       <m:sSubPr>
                         <m:ctrlPr>
-                          <a:rPr lang="en-US" sz="2800" i="1">
+                          <a:rPr lang="en-US" sz="3600" i="1">
                             <a:latin typeface="Cambria Math" panose="02040503050406030204" pitchFamily="18" charset="0"/>
                           </a:rPr>
                         </m:ctrlPr>
                       </m:sSubPr>
                       <m:e>
                         <m:r>
-                          <a:rPr lang="en-US" sz="2800" i="1">
+                          <a:rPr lang="en-US" sz="3600" i="1">
                             <a:latin typeface="Cambria Math" panose="02040503050406030204" pitchFamily="18" charset="0"/>
                           </a:rPr>
                           <m:t>𝑥</m:t>
@@ -4741,7 +4749,7 @@
                       </m:e>
                       <m:sub>
                         <m:r>
-                          <a:rPr lang="en-US" sz="2800" i="1">
+                          <a:rPr lang="en-US" sz="3600" i="1">
                             <a:latin typeface="Cambria Math" panose="02040503050406030204" pitchFamily="18" charset="0"/>
                           </a:rPr>
                           <m:t>𝑖</m:t>
@@ -4751,13 +4759,13 @@
                   </m:oMath>
                 </a14:m>
                 <a:r>
-                  <a:rPr lang="en-US" sz="2800" dirty="0"/>
+                  <a:rPr lang="en-US" sz="3600" dirty="0"/>
                   <a:t> &gt; upper-quartile + 1.5 × IQR, where IQR is the interquartile range of </a:t>
                 </a:r>
                 <a14:m>
                   <m:oMath xmlns:m="http://schemas.openxmlformats.org/officeDocument/2006/math">
                     <m:r>
-                      <a:rPr lang="en-US" sz="2800" b="1" i="1" smtClean="0">
+                      <a:rPr lang="en-US" sz="3600" b="1" i="1" smtClean="0">
                         <a:latin typeface="Cambria Math" panose="02040503050406030204" pitchFamily="18" charset="0"/>
                       </a:rPr>
                       <m:t>𝒙</m:t>
@@ -4765,14 +4773,14 @@
                   </m:oMath>
                 </a14:m>
                 <a:r>
-                  <a:rPr lang="en-US" sz="2800" dirty="0"/>
+                  <a:rPr lang="en-US" sz="3600" dirty="0"/>
                   <a:t>.</a:t>
                 </a:r>
               </a:p>
             </p:txBody>
           </p:sp>
         </mc:Choice>
-        <mc:Fallback xmlns="">
+        <mc:Fallback>
           <p:sp>
             <p:nvSpPr>
               <p:cNvPr id="27" name="TextBox 26">
@@ -4789,8 +4797,8 @@
             </p:nvSpPr>
             <p:spPr>
               <a:xfrm flipH="1">
-                <a:off x="29171607" y="5711252"/>
-                <a:ext cx="12547892" cy="6247864"/>
+                <a:off x="29160107" y="5313319"/>
+                <a:ext cx="12547892" cy="6740307"/>
               </a:xfrm>
               <a:prstGeom prst="rect">
                 <a:avLst/>
@@ -4798,7 +4806,7 @@
               <a:blipFill>
                 <a:blip r:embed="rId5"/>
                 <a:stretch>
-                  <a:fillRect l="-1506" t="-1268" r="-1360" b="-1854"/>
+                  <a:fillRect l="-1506" t="-1448" r="-1457" b="-2534"/>
                 </a:stretch>
               </a:blipFill>
             </p:spPr>
@@ -4964,7 +4972,7 @@
         <p:spPr>
           <a:xfrm>
             <a:off x="727868" y="18554700"/>
-            <a:ext cx="12683332" cy="5509200"/>
+            <a:ext cx="12683332" cy="5324535"/>
           </a:xfrm>
           <a:prstGeom prst="rect">
             <a:avLst/>
@@ -4978,20 +4986,45 @@
           <a:lstStyle/>
           <a:p>
             <a:r>
-              <a:rPr lang="en-US" sz="3200" dirty="0"/>
-              <a:t>Analytical methods for  RNA-</a:t>
-            </a:r>
-            <a:r>
-              <a:rPr lang="en-US" sz="3200" dirty="0" err="1"/>
+              <a:rPr lang="en-US" sz="3600" dirty="0"/>
+              <a:t>RNA-</a:t>
+            </a:r>
+            <a:r>
+              <a:rPr lang="en-US" sz="3600" dirty="0" err="1"/>
               <a:t>Seq</a:t>
             </a:r>
             <a:r>
-              <a:rPr lang="en-US" sz="3200" dirty="0"/>
-              <a:t> assume that the total number of reads assigned to a sample is independent of the relative abundance of probes in the sample, this is referred to as Compositional Invariance (CI).  However, insufficient availability of probes may lead to violations of CI.  We provide a visualization for evaluating CI in a sequencing run.</a:t>
-            </a:r>
-          </a:p>
-          <a:p>
-            <a:endParaRPr lang="en-US" sz="3200" dirty="0"/>
+              <a:rPr lang="en-US" sz="3600" dirty="0"/>
+              <a:t> methods assume that the number of reads assigned to a sample is independent of the relative abundance of probes in the sample (Compositional Invariance (CI)).  However, </a:t>
+            </a:r>
+          </a:p>
+          <a:p>
+            <a:pPr marL="457200" indent="-457200">
+              <a:buFont typeface="Arial" panose="020B0604020202020204" pitchFamily="34" charset="0"/>
+              <a:buChar char="•"/>
+            </a:pPr>
+            <a:r>
+              <a:rPr lang="en-US" sz="3600" dirty="0"/>
+              <a:t>Insufficient availability of probes may lead to violations of CI.  </a:t>
+            </a:r>
+          </a:p>
+          <a:p>
+            <a:pPr marL="457200" indent="-457200">
+              <a:buFont typeface="Arial" panose="020B0604020202020204" pitchFamily="34" charset="0"/>
+              <a:buChar char="•"/>
+            </a:pPr>
+            <a:r>
+              <a:rPr lang="en-US" sz="3600" dirty="0"/>
+              <a:t>Modelling CI in high dimensional RNA-</a:t>
+            </a:r>
+            <a:r>
+              <a:rPr lang="en-US" sz="3600" dirty="0" err="1"/>
+              <a:t>Seq</a:t>
+            </a:r>
+            <a:r>
+              <a:rPr lang="en-US" sz="3600" dirty="0"/>
+              <a:t> can be problematic</a:t>
+            </a:r>
           </a:p>
           <a:p>
             <a:r>
@@ -5082,7 +5115,7 @@
         <p:spPr>
           <a:xfrm flipH="1">
             <a:off x="5900609" y="24306663"/>
-            <a:ext cx="7296776" cy="2246769"/>
+            <a:ext cx="7296776" cy="3108543"/>
           </a:xfrm>
           <a:prstGeom prst="rect">
             <a:avLst/>
@@ -5097,7 +5130,7 @@
           <a:p>
             <a:r>
               <a:rPr lang="en-US" sz="2800" dirty="0"/>
-              <a:t>Figure 2. Distances between samples should be independent of the total reads assigned to each sample.  Violations of compositional invariance can be visualized through the ordering samples by total aligned reads.  </a:t>
+              <a:t>Figure 2. Distances between samples should be independent of the total reads assigned to each sample.  Violations of compositional invariance can be visualized through the ordering samples by total aligned reads.  Gradients along the diagonal in the heatmap (a), or non-zero slopes (b) indicate a violation of CI.</a:t>
             </a:r>
           </a:p>
         </p:txBody>
@@ -5117,7 +5150,7 @@
         <p:spPr>
           <a:xfrm>
             <a:off x="15024330" y="18328943"/>
-            <a:ext cx="12121067" cy="3046988"/>
+            <a:ext cx="12121067" cy="6186309"/>
           </a:xfrm>
           <a:prstGeom prst="rect">
             <a:avLst/>
@@ -5131,15 +5164,15 @@
           <a:lstStyle/>
           <a:p>
             <a:r>
-              <a:rPr lang="en-US" sz="3200" dirty="0"/>
+              <a:rPr lang="en-US" sz="3600" dirty="0"/>
               <a:t>Identifying and controlling for batch effects is a critical step in the transition of RNA-</a:t>
             </a:r>
             <a:r>
-              <a:rPr lang="en-US" sz="3200" dirty="0" err="1"/>
+              <a:rPr lang="en-US" sz="3600" dirty="0" err="1"/>
               <a:t>Seq</a:t>
             </a:r>
             <a:r>
-              <a:rPr lang="en-US" sz="3200" dirty="0"/>
+              <a:rPr lang="en-US" sz="3600" dirty="0"/>
               <a:t> from the lab to the clinic. </a:t>
             </a:r>
           </a:p>
@@ -5149,7 +5182,7 @@
               <a:buChar char="•"/>
             </a:pPr>
             <a:r>
-              <a:rPr lang="en-US" sz="3200" dirty="0"/>
+              <a:rPr lang="en-US" sz="3600" dirty="0"/>
               <a:t>Identify sample groups related to batch with a hierarchical clustering (HC) or principal components analysis (PCA) on CLR transformed counts.</a:t>
             </a:r>
           </a:p>
@@ -5159,17 +5192,330 @@
               <a:buChar char="•"/>
             </a:pPr>
             <a:r>
-              <a:rPr lang="en-US" sz="3200" dirty="0"/>
-              <a:t>CLR transformation </a:t>
-            </a:r>
-            <a:r>
-              <a:rPr lang="en-US" sz="3200"/>
-              <a:t>has several </a:t>
-            </a:r>
-            <a:endParaRPr lang="en-US" sz="3200" dirty="0"/>
-          </a:p>
-        </p:txBody>
-      </p:sp>
+              <a:rPr lang="en-US" sz="3600" dirty="0"/>
+              <a:t>CLR transformation has several benefits:</a:t>
+            </a:r>
+          </a:p>
+          <a:p>
+            <a:pPr marL="914400" lvl="1" indent="-457200">
+              <a:buFont typeface="Arial" panose="020B0604020202020204" pitchFamily="34" charset="0"/>
+              <a:buChar char="•"/>
+            </a:pPr>
+            <a:r>
+              <a:rPr lang="en-US" sz="3600" dirty="0"/>
+              <a:t>Double centering transformation improves PCA biplot interpretation</a:t>
+            </a:r>
+          </a:p>
+          <a:p>
+            <a:pPr marL="914400" lvl="1" indent="-457200">
+              <a:buFont typeface="Arial" panose="020B0604020202020204" pitchFamily="34" charset="0"/>
+              <a:buChar char="•"/>
+            </a:pPr>
+            <a:r>
+              <a:rPr lang="en-US" sz="3600" dirty="0"/>
+              <a:t>Works as single sample normalization without biological assumptions about differential expression among samples</a:t>
+            </a:r>
+          </a:p>
+          <a:p>
+            <a:pPr marL="914400" lvl="1" indent="-457200">
+              <a:buFont typeface="Arial" panose="020B0604020202020204" pitchFamily="34" charset="0"/>
+              <a:buChar char="•"/>
+            </a:pPr>
+            <a:endParaRPr lang="en-US" sz="3600" dirty="0"/>
+          </a:p>
+        </p:txBody>
+      </p:sp>
+      <p:pic>
+        <p:nvPicPr>
+          <p:cNvPr id="9" name="Picture 8">
+            <a:extLst>
+              <a:ext uri="{FF2B5EF4-FFF2-40B4-BE49-F238E27FC236}">
+                <a16:creationId xmlns:a16="http://schemas.microsoft.com/office/drawing/2014/main" id="{6FE30BDE-4E91-40AC-A787-C26BEF577DF4}"/>
+              </a:ext>
+            </a:extLst>
+          </p:cNvPr>
+          <p:cNvPicPr>
+            <a:picLocks noChangeAspect="1"/>
+          </p:cNvPicPr>
+          <p:nvPr/>
+        </p:nvPicPr>
+        <p:blipFill>
+          <a:blip r:embed="rId9">
+            <a:extLst>
+              <a:ext uri="{28A0092B-C50C-407E-A947-70E740481C1C}">
+                <a14:useLocalDpi xmlns:a14="http://schemas.microsoft.com/office/drawing/2010/main" val="0"/>
+              </a:ext>
+            </a:extLst>
+          </a:blip>
+          <a:stretch>
+            <a:fillRect/>
+          </a:stretch>
+        </p:blipFill>
+        <p:spPr>
+          <a:xfrm>
+            <a:off x="19431000" y="24063900"/>
+            <a:ext cx="8328834" cy="4164417"/>
+          </a:xfrm>
+          <a:prstGeom prst="rect">
+            <a:avLst/>
+          </a:prstGeom>
+        </p:spPr>
+      </p:pic>
+      <p:sp>
+        <p:nvSpPr>
+          <p:cNvPr id="16" name="TextBox 15">
+            <a:extLst>
+              <a:ext uri="{FF2B5EF4-FFF2-40B4-BE49-F238E27FC236}">
+                <a16:creationId xmlns:a16="http://schemas.microsoft.com/office/drawing/2014/main" id="{C7CF56D2-A989-4E8B-8811-900A989B8985}"/>
+              </a:ext>
+            </a:extLst>
+          </p:cNvPr>
+          <p:cNvSpPr txBox="1"/>
+          <p:nvPr/>
+        </p:nvSpPr>
+        <p:spPr>
+          <a:xfrm flipH="1">
+            <a:off x="15027113" y="24306663"/>
+            <a:ext cx="4098231" cy="3970318"/>
+          </a:xfrm>
+          <a:prstGeom prst="rect">
+            <a:avLst/>
+          </a:prstGeom>
+          <a:noFill/>
+        </p:spPr>
+        <p:txBody>
+          <a:bodyPr wrap="square" rtlCol="0">
+            <a:spAutoFit/>
+          </a:bodyPr>
+          <a:lstStyle/>
+          <a:p>
+            <a:r>
+              <a:rPr lang="en-US" sz="2800" dirty="0"/>
+              <a:t>Figure 3.  Plot of the first 2 components of a PCA of mi-RNA samples from 5 different sequencing runs.  Batch effects are ore more clearly discernible in the CLR transformed data (B) than in the log-untransformed data (A).</a:t>
+            </a:r>
+          </a:p>
+        </p:txBody>
+      </p:sp>
+      <p:sp>
+        <p:nvSpPr>
+          <p:cNvPr id="18" name="TextBox 17">
+            <a:extLst>
+              <a:ext uri="{FF2B5EF4-FFF2-40B4-BE49-F238E27FC236}">
+                <a16:creationId xmlns:a16="http://schemas.microsoft.com/office/drawing/2014/main" id="{4253CE57-02D5-4E43-A210-88BDE7EDB24A}"/>
+              </a:ext>
+            </a:extLst>
+          </p:cNvPr>
+          <p:cNvSpPr txBox="1"/>
+          <p:nvPr/>
+        </p:nvSpPr>
+        <p:spPr>
+          <a:xfrm flipH="1">
+            <a:off x="29205826" y="18385971"/>
+            <a:ext cx="12513674" cy="8956298"/>
+          </a:xfrm>
+          <a:prstGeom prst="rect">
+            <a:avLst/>
+          </a:prstGeom>
+          <a:noFill/>
+        </p:spPr>
+        <p:txBody>
+          <a:bodyPr wrap="square" rtlCol="0">
+            <a:spAutoFit/>
+          </a:bodyPr>
+          <a:lstStyle/>
+          <a:p>
+            <a:pPr marL="285750" indent="-285750">
+              <a:buFont typeface="Arial" panose="020B0604020202020204" pitchFamily="34" charset="0"/>
+              <a:buChar char="•"/>
+            </a:pPr>
+            <a:r>
+              <a:rPr lang="en-US" sz="3600" dirty="0"/>
+              <a:t>Our fractional read allocation metric can identify problematic samples which arise from multiple failure modes, e.g. a low quality sample or a sequencing problem.</a:t>
+            </a:r>
+          </a:p>
+          <a:p>
+            <a:pPr marL="285750" indent="-285750">
+              <a:buFont typeface="Arial" panose="020B0604020202020204" pitchFamily="34" charset="0"/>
+              <a:buChar char="•"/>
+            </a:pPr>
+            <a:endParaRPr lang="en-US" sz="3600" dirty="0"/>
+          </a:p>
+          <a:p>
+            <a:pPr marL="285750" indent="-285750">
+              <a:buFont typeface="Arial" panose="020B0604020202020204" pitchFamily="34" charset="0"/>
+              <a:buChar char="•"/>
+            </a:pPr>
+            <a:r>
+              <a:rPr lang="en-US" sz="3600" dirty="0"/>
+              <a:t>The identification compositional invariance violations allows the investigator to account for the dependency between the total aligned reads and the composition when modelling.</a:t>
+            </a:r>
+          </a:p>
+          <a:p>
+            <a:pPr marL="285750" indent="-285750">
+              <a:buFont typeface="Arial" panose="020B0604020202020204" pitchFamily="34" charset="0"/>
+              <a:buChar char="•"/>
+            </a:pPr>
+            <a:endParaRPr lang="en-US" sz="3600" dirty="0"/>
+          </a:p>
+          <a:p>
+            <a:pPr marL="285750" indent="-285750">
+              <a:buFont typeface="Arial" panose="020B0604020202020204" pitchFamily="34" charset="0"/>
+              <a:buChar char="•"/>
+            </a:pPr>
+            <a:r>
+              <a:rPr lang="en-US" sz="3600" dirty="0"/>
+              <a:t>The CLR transformation improves PCA biplot interpretation and provides sample normalization.</a:t>
+            </a:r>
+          </a:p>
+          <a:p>
+            <a:pPr marL="285750" indent="-285750">
+              <a:buFont typeface="Arial" panose="020B0604020202020204" pitchFamily="34" charset="0"/>
+              <a:buChar char="•"/>
+            </a:pPr>
+            <a:endParaRPr lang="en-US" sz="3600" dirty="0"/>
+          </a:p>
+          <a:p>
+            <a:r>
+              <a:rPr lang="en-US" sz="3600" b="1" dirty="0"/>
+              <a:t>Future Work</a:t>
+            </a:r>
+          </a:p>
+          <a:p>
+            <a:endParaRPr lang="en-US" sz="3600" b="1" dirty="0"/>
+          </a:p>
+          <a:p>
+            <a:pPr marL="571500" indent="-571500">
+              <a:buFont typeface="Arial" panose="020B0604020202020204" pitchFamily="34" charset="0"/>
+              <a:buChar char="•"/>
+            </a:pPr>
+            <a:r>
+              <a:rPr lang="en-US" sz="3600" dirty="0"/>
+              <a:t>Leverage compositional theory to improve RNA-</a:t>
+            </a:r>
+            <a:r>
+              <a:rPr lang="en-US" sz="3600" dirty="0" err="1"/>
+              <a:t>Seq</a:t>
+            </a:r>
+            <a:r>
+              <a:rPr lang="en-US" sz="3600" dirty="0"/>
+              <a:t> analytical methods</a:t>
+            </a:r>
+          </a:p>
+          <a:p>
+            <a:r>
+              <a:rPr lang="en-US" sz="3600" dirty="0"/>
+              <a:t> </a:t>
+            </a:r>
+          </a:p>
+        </p:txBody>
+      </p:sp>
+      <p:sp>
+        <p:nvSpPr>
+          <p:cNvPr id="28" name="TextBox 27">
+            <a:extLst>
+              <a:ext uri="{FF2B5EF4-FFF2-40B4-BE49-F238E27FC236}">
+                <a16:creationId xmlns:a16="http://schemas.microsoft.com/office/drawing/2014/main" id="{35001920-BF01-4DC3-880A-57E40B512533}"/>
+              </a:ext>
+            </a:extLst>
+          </p:cNvPr>
+          <p:cNvSpPr txBox="1"/>
+          <p:nvPr/>
+        </p:nvSpPr>
+        <p:spPr>
+          <a:xfrm>
+            <a:off x="727867" y="29238669"/>
+            <a:ext cx="24015523" cy="461665"/>
+          </a:xfrm>
+          <a:prstGeom prst="rect">
+            <a:avLst/>
+          </a:prstGeom>
+          <a:noFill/>
+        </p:spPr>
+        <p:txBody>
+          <a:bodyPr wrap="square" rtlCol="0">
+            <a:spAutoFit/>
+          </a:bodyPr>
+          <a:lstStyle/>
+          <a:p>
+            <a:r>
+              <a:rPr lang="en-US" sz="2400" baseline="30000" dirty="0"/>
+              <a:t>1 </a:t>
+            </a:r>
+            <a:r>
+              <a:rPr lang="en-US" sz="2400" dirty="0"/>
+              <a:t>University of Arizona, Mel and Enid Zuckerman College of Public Health, Department of Biostatistics, </a:t>
+            </a:r>
+            <a:r>
+              <a:rPr lang="en-US" sz="2400" baseline="30000" dirty="0"/>
+              <a:t>2</a:t>
+            </a:r>
+            <a:r>
+              <a:rPr lang="en-US" sz="2400" dirty="0"/>
+              <a:t>HTG Molecular Diagnostics, </a:t>
+            </a:r>
+            <a:r>
+              <a:rPr lang="en-US" sz="2400" baseline="30000" dirty="0"/>
+              <a:t>*</a:t>
+            </a:r>
+            <a:r>
+              <a:rPr lang="en-US" sz="2400" dirty="0"/>
+              <a:t>Corresponding Author: </a:t>
+            </a:r>
+            <a:r>
+              <a:rPr lang="en-US" sz="2400" dirty="0" err="1"/>
+              <a:t>dlaroche@email.arizona</a:t>
+            </a:r>
+            <a:r>
+              <a:rPr lang="en-US" sz="2400" dirty="0"/>
+              <a:t> .</a:t>
+            </a:r>
+            <a:r>
+              <a:rPr lang="en-US" sz="2400" dirty="0" err="1"/>
+              <a:t>edu</a:t>
+            </a:r>
+            <a:r>
+              <a:rPr lang="en-US" sz="2400" baseline="30000" dirty="0"/>
+              <a:t> </a:t>
+            </a:r>
+          </a:p>
+        </p:txBody>
+      </p:sp>
+      <p:pic>
+        <p:nvPicPr>
+          <p:cNvPr id="34" name="Picture 33">
+            <a:extLst>
+              <a:ext uri="{FF2B5EF4-FFF2-40B4-BE49-F238E27FC236}">
+                <a16:creationId xmlns:a16="http://schemas.microsoft.com/office/drawing/2014/main" id="{E36F2A0A-B399-4960-A989-85F75BC4D8A6}"/>
+              </a:ext>
+            </a:extLst>
+          </p:cNvPr>
+          <p:cNvPicPr>
+            <a:picLocks noChangeAspect="1"/>
+          </p:cNvPicPr>
+          <p:nvPr/>
+        </p:nvPicPr>
+        <p:blipFill>
+          <a:blip r:embed="rId10" cstate="print">
+            <a:extLst>
+              <a:ext uri="{28A0092B-C50C-407E-A947-70E740481C1C}">
+                <a14:useLocalDpi xmlns:a14="http://schemas.microsoft.com/office/drawing/2010/main" val="0"/>
+              </a:ext>
+            </a:extLst>
+          </a:blip>
+          <a:stretch>
+            <a:fillRect/>
+          </a:stretch>
+        </p:blipFill>
+        <p:spPr>
+          <a:xfrm>
+            <a:off x="39945288" y="28839597"/>
+            <a:ext cx="1252568" cy="1259808"/>
+          </a:xfrm>
+          <a:prstGeom prst="rect">
+            <a:avLst/>
+          </a:prstGeom>
+        </p:spPr>
+      </p:pic>
     </p:spTree>
     <p:extLst>
       <p:ext uri="{BB962C8B-B14F-4D97-AF65-F5344CB8AC3E}">

</xml_diff>

<commit_message>
Created pdf and made a few edits
</commit_message>
<xml_diff>
--- a/LaRoche_CoDaWork2017_Poster.pptx
+++ b/LaRoche_CoDaWork2017_Poster.pptx
@@ -4,6 +4,9 @@
   <p:sldMasterIdLst>
     <p:sldMasterId id="2147483672" r:id="rId1"/>
   </p:sldMasterIdLst>
+  <p:notesMasterIdLst>
+    <p:notesMasterId r:id="rId3"/>
+  </p:notesMasterIdLst>
   <p:sldIdLst>
     <p:sldId id="256" r:id="rId2"/>
   </p:sldIdLst>
@@ -116,6 +119,439 @@
 <p1510:revInfo xmlns:a="http://schemas.openxmlformats.org/drawingml/2006/main" xmlns:r="http://schemas.openxmlformats.org/officeDocument/2006/relationships" xmlns:p1510="http://schemas.microsoft.com/office/powerpoint/2015/10/main"/>
 </file>
 
+<file path=ppt/notesMasters/notesMaster1.xml><?xml version="1.0" encoding="utf-8"?>
+<p:notesMaster xmlns:a="http://schemas.openxmlformats.org/drawingml/2006/main" xmlns:r="http://schemas.openxmlformats.org/officeDocument/2006/relationships" xmlns:p="http://schemas.openxmlformats.org/presentationml/2006/main">
+  <p:cSld>
+    <p:bg>
+      <p:bgRef idx="1001">
+        <a:schemeClr val="bg1"/>
+      </p:bgRef>
+    </p:bg>
+    <p:spTree>
+      <p:nvGrpSpPr>
+        <p:cNvPr id="1" name=""/>
+        <p:cNvGrpSpPr/>
+        <p:nvPr/>
+      </p:nvGrpSpPr>
+      <p:grpSpPr>
+        <a:xfrm>
+          <a:off x="0" y="0"/>
+          <a:ext cx="0" cy="0"/>
+          <a:chOff x="0" y="0"/>
+          <a:chExt cx="0" cy="0"/>
+        </a:xfrm>
+      </p:grpSpPr>
+      <p:sp>
+        <p:nvSpPr>
+          <p:cNvPr id="2" name="Header Placeholder 1"/>
+          <p:cNvSpPr>
+            <a:spLocks noGrp="1"/>
+          </p:cNvSpPr>
+          <p:nvPr>
+            <p:ph type="hdr" sz="quarter"/>
+          </p:nvPr>
+        </p:nvSpPr>
+        <p:spPr>
+          <a:xfrm>
+            <a:off x="0" y="0"/>
+            <a:ext cx="2971800" cy="458788"/>
+          </a:xfrm>
+          <a:prstGeom prst="rect">
+            <a:avLst/>
+          </a:prstGeom>
+        </p:spPr>
+        <p:txBody>
+          <a:bodyPr vert="horz" lIns="91440" tIns="45720" rIns="91440" bIns="45720" rtlCol="0"/>
+          <a:lstStyle>
+            <a:lvl1pPr algn="l">
+              <a:defRPr sz="1200"/>
+            </a:lvl1pPr>
+          </a:lstStyle>
+          <a:p>
+            <a:endParaRPr lang="en-US"/>
+          </a:p>
+        </p:txBody>
+      </p:sp>
+      <p:sp>
+        <p:nvSpPr>
+          <p:cNvPr id="3" name="Date Placeholder 2"/>
+          <p:cNvSpPr>
+            <a:spLocks noGrp="1"/>
+          </p:cNvSpPr>
+          <p:nvPr>
+            <p:ph type="dt" idx="1"/>
+          </p:nvPr>
+        </p:nvSpPr>
+        <p:spPr>
+          <a:xfrm>
+            <a:off x="3884613" y="0"/>
+            <a:ext cx="2971800" cy="458788"/>
+          </a:xfrm>
+          <a:prstGeom prst="rect">
+            <a:avLst/>
+          </a:prstGeom>
+        </p:spPr>
+        <p:txBody>
+          <a:bodyPr vert="horz" lIns="91440" tIns="45720" rIns="91440" bIns="45720" rtlCol="0"/>
+          <a:lstStyle>
+            <a:lvl1pPr algn="r">
+              <a:defRPr sz="1200"/>
+            </a:lvl1pPr>
+          </a:lstStyle>
+          <a:p>
+            <a:fld id="{FFF02D4F-FC2A-486C-B1E5-31EA62BDB445}" type="datetimeFigureOut">
+              <a:rPr lang="en-US" smtClean="0"/>
+              <a:t>5/31/2017</a:t>
+            </a:fld>
+            <a:endParaRPr lang="en-US"/>
+          </a:p>
+        </p:txBody>
+      </p:sp>
+      <p:sp>
+        <p:nvSpPr>
+          <p:cNvPr id="4" name="Slide Image Placeholder 3"/>
+          <p:cNvSpPr>
+            <a:spLocks noGrp="1" noRot="1" noChangeAspect="1"/>
+          </p:cNvSpPr>
+          <p:nvPr>
+            <p:ph type="sldImg" idx="2"/>
+          </p:nvPr>
+        </p:nvSpPr>
+        <p:spPr>
+          <a:xfrm>
+            <a:off x="1241425" y="1143000"/>
+            <a:ext cx="4375150" cy="3086100"/>
+          </a:xfrm>
+          <a:prstGeom prst="rect">
+            <a:avLst/>
+          </a:prstGeom>
+          <a:noFill/>
+          <a:ln w="12700">
+            <a:solidFill>
+              <a:prstClr val="black"/>
+            </a:solidFill>
+          </a:ln>
+        </p:spPr>
+        <p:txBody>
+          <a:bodyPr vert="horz" lIns="91440" tIns="45720" rIns="91440" bIns="45720" rtlCol="0" anchor="ctr"/>
+          <a:lstStyle/>
+          <a:p>
+            <a:endParaRPr lang="en-US"/>
+          </a:p>
+        </p:txBody>
+      </p:sp>
+      <p:sp>
+        <p:nvSpPr>
+          <p:cNvPr id="5" name="Notes Placeholder 4"/>
+          <p:cNvSpPr>
+            <a:spLocks noGrp="1"/>
+          </p:cNvSpPr>
+          <p:nvPr>
+            <p:ph type="body" sz="quarter" idx="3"/>
+          </p:nvPr>
+        </p:nvSpPr>
+        <p:spPr>
+          <a:xfrm>
+            <a:off x="685800" y="4400550"/>
+            <a:ext cx="5486400" cy="3600450"/>
+          </a:xfrm>
+          <a:prstGeom prst="rect">
+            <a:avLst/>
+          </a:prstGeom>
+        </p:spPr>
+        <p:txBody>
+          <a:bodyPr vert="horz" lIns="91440" tIns="45720" rIns="91440" bIns="45720" rtlCol="0"/>
+          <a:lstStyle/>
+          <a:p>
+            <a:pPr lvl="0"/>
+            <a:r>
+              <a:rPr lang="en-US"/>
+              <a:t>Edit Master text styles</a:t>
+            </a:r>
+          </a:p>
+          <a:p>
+            <a:pPr lvl="1"/>
+            <a:r>
+              <a:rPr lang="en-US"/>
+              <a:t>Second level</a:t>
+            </a:r>
+          </a:p>
+          <a:p>
+            <a:pPr lvl="2"/>
+            <a:r>
+              <a:rPr lang="en-US"/>
+              <a:t>Third level</a:t>
+            </a:r>
+          </a:p>
+          <a:p>
+            <a:pPr lvl="3"/>
+            <a:r>
+              <a:rPr lang="en-US"/>
+              <a:t>Fourth level</a:t>
+            </a:r>
+          </a:p>
+          <a:p>
+            <a:pPr lvl="4"/>
+            <a:r>
+              <a:rPr lang="en-US"/>
+              <a:t>Fifth level</a:t>
+            </a:r>
+          </a:p>
+        </p:txBody>
+      </p:sp>
+      <p:sp>
+        <p:nvSpPr>
+          <p:cNvPr id="6" name="Footer Placeholder 5"/>
+          <p:cNvSpPr>
+            <a:spLocks noGrp="1"/>
+          </p:cNvSpPr>
+          <p:nvPr>
+            <p:ph type="ftr" sz="quarter" idx="4"/>
+          </p:nvPr>
+        </p:nvSpPr>
+        <p:spPr>
+          <a:xfrm>
+            <a:off x="0" y="8685213"/>
+            <a:ext cx="2971800" cy="458787"/>
+          </a:xfrm>
+          <a:prstGeom prst="rect">
+            <a:avLst/>
+          </a:prstGeom>
+        </p:spPr>
+        <p:txBody>
+          <a:bodyPr vert="horz" lIns="91440" tIns="45720" rIns="91440" bIns="45720" rtlCol="0" anchor="b"/>
+          <a:lstStyle>
+            <a:lvl1pPr algn="l">
+              <a:defRPr sz="1200"/>
+            </a:lvl1pPr>
+          </a:lstStyle>
+          <a:p>
+            <a:endParaRPr lang="en-US"/>
+          </a:p>
+        </p:txBody>
+      </p:sp>
+      <p:sp>
+        <p:nvSpPr>
+          <p:cNvPr id="7" name="Slide Number Placeholder 6"/>
+          <p:cNvSpPr>
+            <a:spLocks noGrp="1"/>
+          </p:cNvSpPr>
+          <p:nvPr>
+            <p:ph type="sldNum" sz="quarter" idx="5"/>
+          </p:nvPr>
+        </p:nvSpPr>
+        <p:spPr>
+          <a:xfrm>
+            <a:off x="3884613" y="8685213"/>
+            <a:ext cx="2971800" cy="458787"/>
+          </a:xfrm>
+          <a:prstGeom prst="rect">
+            <a:avLst/>
+          </a:prstGeom>
+        </p:spPr>
+        <p:txBody>
+          <a:bodyPr vert="horz" lIns="91440" tIns="45720" rIns="91440" bIns="45720" rtlCol="0" anchor="b"/>
+          <a:lstStyle>
+            <a:lvl1pPr algn="r">
+              <a:defRPr sz="1200"/>
+            </a:lvl1pPr>
+          </a:lstStyle>
+          <a:p>
+            <a:fld id="{BA5B1462-024D-4834-9143-B32AD2C5384B}" type="slidenum">
+              <a:rPr lang="en-US" smtClean="0"/>
+              <a:t>‹#›</a:t>
+            </a:fld>
+            <a:endParaRPr lang="en-US"/>
+          </a:p>
+        </p:txBody>
+      </p:sp>
+    </p:spTree>
+    <p:extLst>
+      <p:ext uri="{BB962C8B-B14F-4D97-AF65-F5344CB8AC3E}">
+        <p14:creationId xmlns:p14="http://schemas.microsoft.com/office/powerpoint/2010/main" val="1428867113"/>
+      </p:ext>
+    </p:extLst>
+  </p:cSld>
+  <p:clrMap bg1="lt1" tx1="dk1" bg2="lt2" tx2="dk2" accent1="accent1" accent2="accent2" accent3="accent3" accent4="accent4" accent5="accent5" accent6="accent6" hlink="hlink" folHlink="folHlink"/>
+  <p:notesStyle>
+    <a:lvl1pPr marL="0" algn="l" defTabSz="914400" rtl="0" eaLnBrk="1" latinLnBrk="0" hangingPunct="1">
+      <a:defRPr sz="1200" kern="1200">
+        <a:solidFill>
+          <a:schemeClr val="tx1"/>
+        </a:solidFill>
+        <a:latin typeface="+mn-lt"/>
+        <a:ea typeface="+mn-ea"/>
+        <a:cs typeface="+mn-cs"/>
+      </a:defRPr>
+    </a:lvl1pPr>
+    <a:lvl2pPr marL="457200" algn="l" defTabSz="914400" rtl="0" eaLnBrk="1" latinLnBrk="0" hangingPunct="1">
+      <a:defRPr sz="1200" kern="1200">
+        <a:solidFill>
+          <a:schemeClr val="tx1"/>
+        </a:solidFill>
+        <a:latin typeface="+mn-lt"/>
+        <a:ea typeface="+mn-ea"/>
+        <a:cs typeface="+mn-cs"/>
+      </a:defRPr>
+    </a:lvl2pPr>
+    <a:lvl3pPr marL="914400" algn="l" defTabSz="914400" rtl="0" eaLnBrk="1" latinLnBrk="0" hangingPunct="1">
+      <a:defRPr sz="1200" kern="1200">
+        <a:solidFill>
+          <a:schemeClr val="tx1"/>
+        </a:solidFill>
+        <a:latin typeface="+mn-lt"/>
+        <a:ea typeface="+mn-ea"/>
+        <a:cs typeface="+mn-cs"/>
+      </a:defRPr>
+    </a:lvl3pPr>
+    <a:lvl4pPr marL="1371600" algn="l" defTabSz="914400" rtl="0" eaLnBrk="1" latinLnBrk="0" hangingPunct="1">
+      <a:defRPr sz="1200" kern="1200">
+        <a:solidFill>
+          <a:schemeClr val="tx1"/>
+        </a:solidFill>
+        <a:latin typeface="+mn-lt"/>
+        <a:ea typeface="+mn-ea"/>
+        <a:cs typeface="+mn-cs"/>
+      </a:defRPr>
+    </a:lvl4pPr>
+    <a:lvl5pPr marL="1828800" algn="l" defTabSz="914400" rtl="0" eaLnBrk="1" latinLnBrk="0" hangingPunct="1">
+      <a:defRPr sz="1200" kern="1200">
+        <a:solidFill>
+          <a:schemeClr val="tx1"/>
+        </a:solidFill>
+        <a:latin typeface="+mn-lt"/>
+        <a:ea typeface="+mn-ea"/>
+        <a:cs typeface="+mn-cs"/>
+      </a:defRPr>
+    </a:lvl5pPr>
+    <a:lvl6pPr marL="2286000" algn="l" defTabSz="914400" rtl="0" eaLnBrk="1" latinLnBrk="0" hangingPunct="1">
+      <a:defRPr sz="1200" kern="1200">
+        <a:solidFill>
+          <a:schemeClr val="tx1"/>
+        </a:solidFill>
+        <a:latin typeface="+mn-lt"/>
+        <a:ea typeface="+mn-ea"/>
+        <a:cs typeface="+mn-cs"/>
+      </a:defRPr>
+    </a:lvl6pPr>
+    <a:lvl7pPr marL="2743200" algn="l" defTabSz="914400" rtl="0" eaLnBrk="1" latinLnBrk="0" hangingPunct="1">
+      <a:defRPr sz="1200" kern="1200">
+        <a:solidFill>
+          <a:schemeClr val="tx1"/>
+        </a:solidFill>
+        <a:latin typeface="+mn-lt"/>
+        <a:ea typeface="+mn-ea"/>
+        <a:cs typeface="+mn-cs"/>
+      </a:defRPr>
+    </a:lvl7pPr>
+    <a:lvl8pPr marL="3200400" algn="l" defTabSz="914400" rtl="0" eaLnBrk="1" latinLnBrk="0" hangingPunct="1">
+      <a:defRPr sz="1200" kern="1200">
+        <a:solidFill>
+          <a:schemeClr val="tx1"/>
+        </a:solidFill>
+        <a:latin typeface="+mn-lt"/>
+        <a:ea typeface="+mn-ea"/>
+        <a:cs typeface="+mn-cs"/>
+      </a:defRPr>
+    </a:lvl8pPr>
+    <a:lvl9pPr marL="3657600" algn="l" defTabSz="914400" rtl="0" eaLnBrk="1" latinLnBrk="0" hangingPunct="1">
+      <a:defRPr sz="1200" kern="1200">
+        <a:solidFill>
+          <a:schemeClr val="tx1"/>
+        </a:solidFill>
+        <a:latin typeface="+mn-lt"/>
+        <a:ea typeface="+mn-ea"/>
+        <a:cs typeface="+mn-cs"/>
+      </a:defRPr>
+    </a:lvl9pPr>
+  </p:notesStyle>
+</p:notesMaster>
+</file>
+
+<file path=ppt/notesSlides/notesSlide1.xml><?xml version="1.0" encoding="utf-8"?>
+<p:notes xmlns:a="http://schemas.openxmlformats.org/drawingml/2006/main" xmlns:r="http://schemas.openxmlformats.org/officeDocument/2006/relationships" xmlns:p="http://schemas.openxmlformats.org/presentationml/2006/main">
+  <p:cSld>
+    <p:spTree>
+      <p:nvGrpSpPr>
+        <p:cNvPr id="1" name=""/>
+        <p:cNvGrpSpPr/>
+        <p:nvPr/>
+      </p:nvGrpSpPr>
+      <p:grpSpPr>
+        <a:xfrm>
+          <a:off x="0" y="0"/>
+          <a:ext cx="0" cy="0"/>
+          <a:chOff x="0" y="0"/>
+          <a:chExt cx="0" cy="0"/>
+        </a:xfrm>
+      </p:grpSpPr>
+      <p:sp>
+        <p:nvSpPr>
+          <p:cNvPr id="2" name="Slide Image Placeholder 1"/>
+          <p:cNvSpPr>
+            <a:spLocks noGrp="1" noRot="1" noChangeAspect="1"/>
+          </p:cNvSpPr>
+          <p:nvPr>
+            <p:ph type="sldImg"/>
+          </p:nvPr>
+        </p:nvSpPr>
+        <p:spPr/>
+      </p:sp>
+      <p:sp>
+        <p:nvSpPr>
+          <p:cNvPr id="3" name="Notes Placeholder 2"/>
+          <p:cNvSpPr>
+            <a:spLocks noGrp="1"/>
+          </p:cNvSpPr>
+          <p:nvPr>
+            <p:ph type="body" idx="1"/>
+          </p:nvPr>
+        </p:nvSpPr>
+        <p:spPr/>
+        <p:txBody>
+          <a:bodyPr/>
+          <a:lstStyle/>
+          <a:p>
+            <a:endParaRPr lang="en-US" dirty="0"/>
+          </a:p>
+        </p:txBody>
+      </p:sp>
+      <p:sp>
+        <p:nvSpPr>
+          <p:cNvPr id="4" name="Slide Number Placeholder 3"/>
+          <p:cNvSpPr>
+            <a:spLocks noGrp="1"/>
+          </p:cNvSpPr>
+          <p:nvPr>
+            <p:ph type="sldNum" sz="quarter" idx="10"/>
+          </p:nvPr>
+        </p:nvSpPr>
+        <p:spPr/>
+        <p:txBody>
+          <a:bodyPr/>
+          <a:lstStyle/>
+          <a:p>
+            <a:fld id="{BA5B1462-024D-4834-9143-B32AD2C5384B}" type="slidenum">
+              <a:rPr lang="en-US" smtClean="0"/>
+              <a:t>1</a:t>
+            </a:fld>
+            <a:endParaRPr lang="en-US"/>
+          </a:p>
+        </p:txBody>
+      </p:sp>
+    </p:spTree>
+    <p:extLst>
+      <p:ext uri="{BB962C8B-B14F-4D97-AF65-F5344CB8AC3E}">
+        <p14:creationId xmlns:p14="http://schemas.microsoft.com/office/powerpoint/2010/main" val="3267510599"/>
+      </p:ext>
+    </p:extLst>
+  </p:cSld>
+  <p:clrMapOvr>
+    <a:masterClrMapping/>
+  </p:clrMapOvr>
+</p:notes>
+</file>
+
 <file path=ppt/slideLayouts/slideLayout1.xml><?xml version="1.0" encoding="utf-8"?>
 <p:sldLayout xmlns:a="http://schemas.openxmlformats.org/drawingml/2006/main" xmlns:r="http://schemas.openxmlformats.org/officeDocument/2006/relationships" xmlns:p="http://schemas.openxmlformats.org/presentationml/2006/main" type="title" preserve="1">
   <p:cSld name="Title Slide">
@@ -247,7 +683,7 @@
           <a:p>
             <a:fld id="{417B607A-21E1-4CA4-BF44-865E2BD1C4B9}" type="datetimeFigureOut">
               <a:rPr lang="en-US" smtClean="0"/>
-              <a:t>5/28/2017</a:t>
+              <a:t>5/31/2017</a:t>
             </a:fld>
             <a:endParaRPr lang="en-US"/>
           </a:p>
@@ -417,7 +853,7 @@
           <a:p>
             <a:fld id="{417B607A-21E1-4CA4-BF44-865E2BD1C4B9}" type="datetimeFigureOut">
               <a:rPr lang="en-US" smtClean="0"/>
-              <a:t>5/28/2017</a:t>
+              <a:t>5/31/2017</a:t>
             </a:fld>
             <a:endParaRPr lang="en-US"/>
           </a:p>
@@ -597,7 +1033,7 @@
           <a:p>
             <a:fld id="{417B607A-21E1-4CA4-BF44-865E2BD1C4B9}" type="datetimeFigureOut">
               <a:rPr lang="en-US" smtClean="0"/>
-              <a:t>5/28/2017</a:t>
+              <a:t>5/31/2017</a:t>
             </a:fld>
             <a:endParaRPr lang="en-US"/>
           </a:p>
@@ -767,7 +1203,7 @@
           <a:p>
             <a:fld id="{417B607A-21E1-4CA4-BF44-865E2BD1C4B9}" type="datetimeFigureOut">
               <a:rPr lang="en-US" smtClean="0"/>
-              <a:t>5/28/2017</a:t>
+              <a:t>5/31/2017</a:t>
             </a:fld>
             <a:endParaRPr lang="en-US"/>
           </a:p>
@@ -1011,7 +1447,7 @@
           <a:p>
             <a:fld id="{417B607A-21E1-4CA4-BF44-865E2BD1C4B9}" type="datetimeFigureOut">
               <a:rPr lang="en-US" smtClean="0"/>
-              <a:t>5/28/2017</a:t>
+              <a:t>5/31/2017</a:t>
             </a:fld>
             <a:endParaRPr lang="en-US"/>
           </a:p>
@@ -1243,7 +1679,7 @@
           <a:p>
             <a:fld id="{417B607A-21E1-4CA4-BF44-865E2BD1C4B9}" type="datetimeFigureOut">
               <a:rPr lang="en-US" smtClean="0"/>
-              <a:t>5/28/2017</a:t>
+              <a:t>5/31/2017</a:t>
             </a:fld>
             <a:endParaRPr lang="en-US"/>
           </a:p>
@@ -1610,7 +2046,7 @@
           <a:p>
             <a:fld id="{417B607A-21E1-4CA4-BF44-865E2BD1C4B9}" type="datetimeFigureOut">
               <a:rPr lang="en-US" smtClean="0"/>
-              <a:t>5/28/2017</a:t>
+              <a:t>5/31/2017</a:t>
             </a:fld>
             <a:endParaRPr lang="en-US"/>
           </a:p>
@@ -1728,7 +2164,7 @@
           <a:p>
             <a:fld id="{417B607A-21E1-4CA4-BF44-865E2BD1C4B9}" type="datetimeFigureOut">
               <a:rPr lang="en-US" smtClean="0"/>
-              <a:t>5/28/2017</a:t>
+              <a:t>5/31/2017</a:t>
             </a:fld>
             <a:endParaRPr lang="en-US"/>
           </a:p>
@@ -1823,7 +2259,7 @@
           <a:p>
             <a:fld id="{417B607A-21E1-4CA4-BF44-865E2BD1C4B9}" type="datetimeFigureOut">
               <a:rPr lang="en-US" smtClean="0"/>
-              <a:t>5/28/2017</a:t>
+              <a:t>5/31/2017</a:t>
             </a:fld>
             <a:endParaRPr lang="en-US"/>
           </a:p>
@@ -2100,7 +2536,7 @@
           <a:p>
             <a:fld id="{417B607A-21E1-4CA4-BF44-865E2BD1C4B9}" type="datetimeFigureOut">
               <a:rPr lang="en-US" smtClean="0"/>
-              <a:t>5/28/2017</a:t>
+              <a:t>5/31/2017</a:t>
             </a:fld>
             <a:endParaRPr lang="en-US"/>
           </a:p>
@@ -2357,7 +2793,7 @@
           <a:p>
             <a:fld id="{417B607A-21E1-4CA4-BF44-865E2BD1C4B9}" type="datetimeFigureOut">
               <a:rPr lang="en-US" smtClean="0"/>
-              <a:t>5/28/2017</a:t>
+              <a:t>5/31/2017</a:t>
             </a:fld>
             <a:endParaRPr lang="en-US"/>
           </a:p>
@@ -2570,7 +3006,7 @@
           <a:p>
             <a:fld id="{417B607A-21E1-4CA4-BF44-865E2BD1C4B9}" type="datetimeFigureOut">
               <a:rPr lang="en-US" smtClean="0"/>
-              <a:t>5/28/2017</a:t>
+              <a:t>5/31/2017</a:t>
             </a:fld>
             <a:endParaRPr lang="en-US"/>
           </a:p>
@@ -2990,7 +3426,7 @@
         <p:spPr>
           <a:xfrm>
             <a:off x="7287425" y="861617"/>
-            <a:ext cx="28180626" cy="2706305"/>
+            <a:ext cx="28180626" cy="2586606"/>
           </a:xfrm>
           <a:prstGeom prst="rect">
             <a:avLst/>
@@ -3032,47 +3468,39 @@
           <a:p>
             <a:pPr algn="ctr"/>
             <a:r>
-              <a:rPr lang="en-US" sz="4477" dirty="0"/>
+              <a:rPr lang="en-US" sz="4000" dirty="0"/>
               <a:t>Dominic LaRoche</a:t>
             </a:r>
             <a:r>
-              <a:rPr lang="en-US" sz="4477" baseline="30000" dirty="0"/>
+              <a:rPr lang="en-US" sz="4000" baseline="30000" dirty="0"/>
               <a:t>1,2*</a:t>
             </a:r>
             <a:r>
-              <a:rPr lang="en-US" sz="4477" dirty="0"/>
+              <a:rPr lang="en-US" sz="4000" dirty="0"/>
               <a:t>, Dean Billheimer</a:t>
             </a:r>
             <a:r>
-              <a:rPr lang="en-US" sz="4477" baseline="30000" dirty="0"/>
+              <a:rPr lang="en-US" sz="4000" baseline="30000" dirty="0"/>
               <a:t>1</a:t>
             </a:r>
             <a:r>
-              <a:rPr lang="en-US" sz="4477" dirty="0"/>
-              <a:t>, Shripad Sinari</a:t>
-            </a:r>
-            <a:r>
-              <a:rPr lang="en-US" sz="4477" baseline="30000" dirty="0"/>
-              <a:t>1</a:t>
-            </a:r>
-            <a:r>
-              <a:rPr lang="en-US" sz="4477" dirty="0"/>
+              <a:rPr lang="en-US" sz="4000" dirty="0"/>
               <a:t>, Kurt Michels</a:t>
             </a:r>
             <a:r>
-              <a:rPr lang="en-US" sz="4477" baseline="30000" dirty="0"/>
+              <a:rPr lang="en-US" sz="4000" baseline="30000" dirty="0"/>
               <a:t>2</a:t>
             </a:r>
             <a:r>
-              <a:rPr lang="en-US" sz="4477" dirty="0"/>
+              <a:rPr lang="en-US" sz="4000" dirty="0"/>
               <a:t>, and Bonnie LaFleur</a:t>
             </a:r>
             <a:r>
-              <a:rPr lang="en-US" sz="4477" baseline="30000" dirty="0"/>
+              <a:rPr lang="en-US" sz="4000" baseline="30000" dirty="0"/>
               <a:t>2</a:t>
             </a:r>
             <a:r>
-              <a:rPr lang="en-US" sz="4477" dirty="0"/>
+              <a:rPr lang="en-US" sz="4000" dirty="0"/>
               <a:t> </a:t>
             </a:r>
           </a:p>
@@ -3459,7 +3887,7 @@
           <p:nvPr/>
         </p:nvPicPr>
         <p:blipFill>
-          <a:blip r:embed="rId2">
+          <a:blip r:embed="rId3">
             <a:extLst>
               <a:ext uri="{28A0092B-C50C-407E-A947-70E740481C1C}">
                 <a14:useLocalDpi xmlns:a14="http://schemas.microsoft.com/office/drawing/2010/main" val="0"/>
@@ -3495,7 +3923,7 @@
           <p:nvPr/>
         </p:nvPicPr>
         <p:blipFill>
-          <a:blip r:embed="rId3">
+          <a:blip r:embed="rId4">
             <a:extLst>
               <a:ext uri="{28A0092B-C50C-407E-A947-70E740481C1C}">
                 <a14:useLocalDpi xmlns:a14="http://schemas.microsoft.com/office/drawing/2010/main" val="0"/>
@@ -3835,15 +4263,7 @@
             </a:r>
             <a:r>
               <a:rPr lang="en-US" sz="3600" dirty="0"/>
-              <a:t> creates the need for </a:t>
-            </a:r>
-            <a:r>
-              <a:rPr lang="en-US" sz="3600" dirty="0" err="1"/>
-              <a:t>pos</a:t>
-            </a:r>
-            <a:r>
-              <a:rPr lang="en-US" sz="3600" dirty="0"/>
-              <a:t>-sequencing quality control metrics.</a:t>
+              <a:t> creates the need for post-sequencing quality control metrics.</a:t>
             </a:r>
           </a:p>
           <a:p>
@@ -3888,7 +4308,7 @@
             <p:spPr>
               <a:xfrm>
                 <a:off x="15077274" y="5313319"/>
-                <a:ext cx="12231974" cy="10257360"/>
+                <a:ext cx="12231974" cy="9924961"/>
               </a:xfrm>
               <a:prstGeom prst="rect">
                 <a:avLst/>
@@ -3992,7 +4412,7 @@
                 <a14:m>
                   <m:oMath xmlns:m="http://schemas.openxmlformats.org/officeDocument/2006/math">
                     <m:r>
-                      <a:rPr lang="en-US" sz="3200" b="0" i="1" smtClean="0">
+                      <a:rPr lang="en-US" sz="3600" b="0" i="1" smtClean="0">
                         <a:latin typeface="Cambria Math" panose="02040503050406030204" pitchFamily="18" charset="0"/>
                       </a:rPr>
                       <m:t>𝐶𝐿𝑅</m:t>
@@ -4000,7 +4420,7 @@
                     <m:d>
                       <m:dPr>
                         <m:ctrlPr>
-                          <a:rPr lang="en-US" sz="3200" b="0" i="1" smtClean="0">
+                          <a:rPr lang="en-US" sz="3600" b="0" i="1" smtClean="0">
                             <a:latin typeface="Cambria Math" panose="02040503050406030204" pitchFamily="18" charset="0"/>
                           </a:rPr>
                         </m:ctrlPr>
@@ -4009,14 +4429,14 @@
                         <m:sSub>
                           <m:sSubPr>
                             <m:ctrlPr>
-                              <a:rPr lang="en-US" sz="3200" b="0" i="1" smtClean="0">
+                              <a:rPr lang="en-US" sz="3600" b="0" i="1" smtClean="0">
                                 <a:latin typeface="Cambria Math" panose="02040503050406030204" pitchFamily="18" charset="0"/>
                               </a:rPr>
                             </m:ctrlPr>
                           </m:sSubPr>
                           <m:e>
                             <m:r>
-                              <a:rPr lang="en-US" sz="3200" b="0" i="1" smtClean="0">
+                              <a:rPr lang="en-US" sz="3600" b="0" i="1" smtClean="0">
                                 <a:latin typeface="Cambria Math" panose="02040503050406030204" pitchFamily="18" charset="0"/>
                               </a:rPr>
                               <m:t>𝑥</m:t>
@@ -4024,7 +4444,7 @@
                           </m:e>
                           <m:sub>
                             <m:r>
-                              <a:rPr lang="en-US" sz="3200" b="0" i="1" smtClean="0">
+                              <a:rPr lang="en-US" sz="3600" b="0" i="1" smtClean="0">
                                 <a:latin typeface="Cambria Math" panose="02040503050406030204" pitchFamily="18" charset="0"/>
                               </a:rPr>
                               <m:t>𝑖</m:t>
@@ -4034,19 +4454,19 @@
                       </m:e>
                     </m:d>
                     <m:r>
-                      <a:rPr lang="en-US" sz="3200" b="0" i="1" smtClean="0">
+                      <a:rPr lang="en-US" sz="3600" b="0" i="1" smtClean="0">
                         <a:latin typeface="Cambria Math" panose="02040503050406030204" pitchFamily="18" charset="0"/>
                       </a:rPr>
                       <m:t>=</m:t>
                     </m:r>
                     <m:r>
-                      <a:rPr lang="en-US" sz="3200" b="0" i="1" smtClean="0">
+                      <a:rPr lang="en-US" sz="3600" b="0" i="1" smtClean="0">
                         <a:latin typeface="Cambria Math" panose="02040503050406030204" pitchFamily="18" charset="0"/>
                       </a:rPr>
                       <m:t>𝑙𝑜𝑔</m:t>
                     </m:r>
                     <m:r>
-                      <a:rPr lang="en-US" sz="3200" b="0" i="1" smtClean="0">
+                      <a:rPr lang="en-US" sz="3600" b="0" i="1" smtClean="0">
                         <a:latin typeface="Cambria Math" panose="02040503050406030204" pitchFamily="18" charset="0"/>
                       </a:rPr>
                       <m:t> </m:t>
@@ -4054,7 +4474,7 @@
                     <m:d>
                       <m:dPr>
                         <m:ctrlPr>
-                          <a:rPr lang="en-US" sz="3200" b="0" i="1" smtClean="0">
+                          <a:rPr lang="en-US" sz="3600" b="0" i="1" smtClean="0">
                             <a:latin typeface="Cambria Math" panose="02040503050406030204" pitchFamily="18" charset="0"/>
                           </a:rPr>
                         </m:ctrlPr>
@@ -4063,7 +4483,7 @@
                         <m:f>
                           <m:fPr>
                             <m:ctrlPr>
-                              <a:rPr lang="en-US" sz="3200" b="0" i="1" smtClean="0">
+                              <a:rPr lang="en-US" sz="3600" b="0" i="1" smtClean="0">
                                 <a:latin typeface="Cambria Math" panose="02040503050406030204" pitchFamily="18" charset="0"/>
                               </a:rPr>
                             </m:ctrlPr>
@@ -4072,14 +4492,14 @@
                             <m:sSub>
                               <m:sSubPr>
                                 <m:ctrlPr>
-                                  <a:rPr lang="en-US" sz="3200" b="0" i="1" smtClean="0">
+                                  <a:rPr lang="en-US" sz="3600" b="0" i="1" smtClean="0">
                                     <a:latin typeface="Cambria Math" panose="02040503050406030204" pitchFamily="18" charset="0"/>
                                   </a:rPr>
                                 </m:ctrlPr>
                               </m:sSubPr>
                               <m:e>
                                 <m:r>
-                                  <a:rPr lang="en-US" sz="3200" b="0" i="1" smtClean="0">
+                                  <a:rPr lang="en-US" sz="3600" b="0" i="1" smtClean="0">
                                     <a:latin typeface="Cambria Math" panose="02040503050406030204" pitchFamily="18" charset="0"/>
                                   </a:rPr>
                                   <m:t>𝑥</m:t>
@@ -4087,7 +4507,7 @@
                               </m:e>
                               <m:sub>
                                 <m:r>
-                                  <a:rPr lang="en-US" sz="3200" b="0" i="1" smtClean="0">
+                                  <a:rPr lang="en-US" sz="3600" b="0" i="1" smtClean="0">
                                     <a:latin typeface="Cambria Math" panose="02040503050406030204" pitchFamily="18" charset="0"/>
                                   </a:rPr>
                                   <m:t>𝑖</m:t>
@@ -4097,25 +4517,25 @@
                           </m:num>
                           <m:den>
                             <m:r>
-                              <a:rPr lang="en-US" sz="3200" b="0" i="1" smtClean="0">
+                              <a:rPr lang="en-US" sz="3600" b="0" i="1" smtClean="0">
                                 <a:latin typeface="Cambria Math" panose="02040503050406030204" pitchFamily="18" charset="0"/>
                               </a:rPr>
                               <m:t>𝑔</m:t>
                             </m:r>
                             <m:r>
-                              <a:rPr lang="en-US" sz="3200" b="0" i="1" smtClean="0">
+                              <a:rPr lang="en-US" sz="3600" b="0" i="1" smtClean="0">
                                 <a:latin typeface="Cambria Math" panose="02040503050406030204" pitchFamily="18" charset="0"/>
                               </a:rPr>
                               <m:t>(</m:t>
                             </m:r>
                             <m:r>
-                              <a:rPr lang="en-US" sz="3200" b="1" i="1" smtClean="0">
+                              <a:rPr lang="en-US" sz="3600" b="1" i="1" smtClean="0">
                                 <a:latin typeface="Cambria Math" panose="02040503050406030204" pitchFamily="18" charset="0"/>
                               </a:rPr>
                               <m:t>𝒙</m:t>
                             </m:r>
                             <m:r>
-                              <a:rPr lang="en-US" sz="3200" b="1" i="1" smtClean="0">
+                              <a:rPr lang="en-US" sz="3600" b="1" i="1" smtClean="0">
                                 <a:latin typeface="Cambria Math" panose="02040503050406030204" pitchFamily="18" charset="0"/>
                               </a:rPr>
                               <m:t>)</m:t>
@@ -4128,13 +4548,11 @@
                 </a14:m>
                 <a:r>
                   <a:rPr lang="en-US" sz="3600" b="0" dirty="0"/>
-                  <a:t>,	</a:t>
+                  <a:t>, </a:t>
                 </a:r>
-              </a:p>
-              <a:p>
                 <a:r>
                   <a:rPr lang="en-US" sz="2800" dirty="0"/>
-                  <a:t>		where </a:t>
+                  <a:t>where </a:t>
                 </a:r>
                 <a14:m>
                   <m:oMath xmlns:m="http://schemas.openxmlformats.org/officeDocument/2006/math">
@@ -4543,15 +4961,15 @@
             <p:spPr>
               <a:xfrm>
                 <a:off x="15077274" y="5313319"/>
-                <a:ext cx="12231974" cy="10257360"/>
+                <a:ext cx="12231974" cy="9924961"/>
               </a:xfrm>
               <a:prstGeom prst="rect">
                 <a:avLst/>
               </a:prstGeom>
               <a:blipFill>
-                <a:blip r:embed="rId4"/>
+                <a:blip r:embed="rId5"/>
                 <a:stretch>
-                  <a:fillRect l="-1495" t="-951"/>
+                  <a:fillRect l="-1495" t="-983"/>
                 </a:stretch>
               </a:blipFill>
             </p:spPr>
@@ -4570,8 +4988,8 @@
           </p:sp>
         </mc:Fallback>
       </mc:AlternateContent>
-      <mc:AlternateContent xmlns:mc="http://schemas.openxmlformats.org/markup-compatibility/2006">
-        <mc:Choice xmlns:a14="http://schemas.microsoft.com/office/drawing/2010/main" Requires="a14">
+      <mc:AlternateContent xmlns:mc="http://schemas.openxmlformats.org/markup-compatibility/2006" xmlns:a14="http://schemas.microsoft.com/office/drawing/2010/main">
+        <mc:Choice Requires="a14">
           <p:sp>
             <p:nvSpPr>
               <p:cNvPr id="27" name="TextBox 26">
@@ -4780,7 +5198,7 @@
             </p:txBody>
           </p:sp>
         </mc:Choice>
-        <mc:Fallback>
+        <mc:Fallback xmlns="">
           <p:sp>
             <p:nvSpPr>
               <p:cNvPr id="27" name="TextBox 26">
@@ -4804,7 +5222,7 @@
                 <a:avLst/>
               </a:prstGeom>
               <a:blipFill>
-                <a:blip r:embed="rId5"/>
+                <a:blip r:embed="rId6"/>
                 <a:stretch>
                   <a:fillRect l="-1506" t="-1448" r="-1457" b="-2534"/>
                 </a:stretch>
@@ -4860,7 +5278,7 @@
             <p:nvPr/>
           </p:nvPicPr>
           <p:blipFill>
-            <a:blip r:embed="rId6">
+            <a:blip r:embed="rId7">
               <a:extLst>
                 <a:ext uri="{28A0092B-C50C-407E-A947-70E740481C1C}">
                   <a14:useLocalDpi xmlns:a14="http://schemas.microsoft.com/office/drawing/2010/main" val="0"/>
@@ -4896,7 +5314,7 @@
             <p:nvPr/>
           </p:nvPicPr>
           <p:blipFill>
-            <a:blip r:embed="rId7">
+            <a:blip r:embed="rId8">
               <a:extLst>
                 <a:ext uri="{28A0092B-C50C-407E-A947-70E740481C1C}">
                   <a14:useLocalDpi xmlns:a14="http://schemas.microsoft.com/office/drawing/2010/main" val="0"/>
@@ -4971,8 +5389,8 @@
         </p:nvSpPr>
         <p:spPr>
           <a:xfrm>
-            <a:off x="727868" y="18554700"/>
-            <a:ext cx="12683332" cy="5324535"/>
+            <a:off x="727866" y="18177727"/>
+            <a:ext cx="12683332" cy="6186309"/>
           </a:xfrm>
           <a:prstGeom prst="rect">
             <a:avLst/>
@@ -4995,7 +5413,7 @@
             </a:r>
             <a:r>
               <a:rPr lang="en-US" sz="3600" dirty="0"/>
-              <a:t> methods assume that the number of reads assigned to a sample is independent of the relative abundance of probes in the sample (Compositional Invariance (CI)).  However, </a:t>
+              <a:t> analyses assume the number of reads assigned to a sample is independent of the relative abundance of  probes (Compositional Invariance (CI)). </a:t>
             </a:r>
           </a:p>
           <a:p>
@@ -5028,7 +5446,7 @@
           </a:p>
           <a:p>
             <a:r>
-              <a:rPr lang="en-US" sz="3200" b="1" dirty="0"/>
+              <a:rPr lang="en-US" sz="3600" b="1" dirty="0"/>
               <a:t>Method: </a:t>
             </a:r>
           </a:p>
@@ -5038,7 +5456,7 @@
               <a:buAutoNum type="arabicPeriod"/>
             </a:pPr>
             <a:r>
-              <a:rPr lang="en-US" sz="3200" dirty="0"/>
+              <a:rPr lang="en-US" sz="3600" dirty="0"/>
               <a:t>Calculate all pairwise distances using Aitchison Distance</a:t>
             </a:r>
           </a:p>
@@ -5048,7 +5466,7 @@
               <a:buAutoNum type="arabicPeriod"/>
             </a:pPr>
             <a:r>
-              <a:rPr lang="en-US" sz="3200" dirty="0"/>
+              <a:rPr lang="en-US" sz="3600" dirty="0"/>
               <a:t>Create heatmap of distances with samples ordered by total reads</a:t>
             </a:r>
           </a:p>
@@ -5058,7 +5476,7 @@
               <a:buAutoNum type="arabicPeriod"/>
             </a:pPr>
             <a:r>
-              <a:rPr lang="en-US" sz="3200" dirty="0"/>
+              <a:rPr lang="en-US" sz="3600" dirty="0"/>
               <a:t>Plot multi-variate distance between each sample and the center of the top 25% of samples with respect to total reads</a:t>
             </a:r>
           </a:p>
@@ -5070,167 +5488,6 @@
             <a:extLst>
               <a:ext uri="{FF2B5EF4-FFF2-40B4-BE49-F238E27FC236}">
                 <a16:creationId xmlns:a16="http://schemas.microsoft.com/office/drawing/2014/main" id="{AB9DFE89-EED4-42AF-B658-D15E500BA8C1}"/>
-              </a:ext>
-            </a:extLst>
-          </p:cNvPr>
-          <p:cNvPicPr>
-            <a:picLocks noChangeAspect="1"/>
-          </p:cNvPicPr>
-          <p:nvPr/>
-        </p:nvPicPr>
-        <p:blipFill>
-          <a:blip r:embed="rId8">
-            <a:extLst>
-              <a:ext uri="{28A0092B-C50C-407E-A947-70E740481C1C}">
-                <a14:useLocalDpi xmlns:a14="http://schemas.microsoft.com/office/drawing/2010/main" val="0"/>
-              </a:ext>
-            </a:extLst>
-          </a:blip>
-          <a:stretch>
-            <a:fillRect/>
-          </a:stretch>
-        </p:blipFill>
-        <p:spPr>
-          <a:xfrm>
-            <a:off x="937409" y="24063900"/>
-            <a:ext cx="4396591" cy="4396591"/>
-          </a:xfrm>
-          <a:prstGeom prst="rect">
-            <a:avLst/>
-          </a:prstGeom>
-        </p:spPr>
-      </p:pic>
-      <p:sp>
-        <p:nvSpPr>
-          <p:cNvPr id="7" name="TextBox 6">
-            <a:extLst>
-              <a:ext uri="{FF2B5EF4-FFF2-40B4-BE49-F238E27FC236}">
-                <a16:creationId xmlns:a16="http://schemas.microsoft.com/office/drawing/2014/main" id="{33ACBAC5-6B78-49ED-AABA-43E3A235C19F}"/>
-              </a:ext>
-            </a:extLst>
-          </p:cNvPr>
-          <p:cNvSpPr txBox="1"/>
-          <p:nvPr/>
-        </p:nvSpPr>
-        <p:spPr>
-          <a:xfrm flipH="1">
-            <a:off x="5900609" y="24306663"/>
-            <a:ext cx="7296776" cy="3108543"/>
-          </a:xfrm>
-          <a:prstGeom prst="rect">
-            <a:avLst/>
-          </a:prstGeom>
-          <a:noFill/>
-        </p:spPr>
-        <p:txBody>
-          <a:bodyPr wrap="square" rtlCol="0">
-            <a:spAutoFit/>
-          </a:bodyPr>
-          <a:lstStyle/>
-          <a:p>
-            <a:r>
-              <a:rPr lang="en-US" sz="2800" dirty="0"/>
-              <a:t>Figure 2. Distances between samples should be independent of the total reads assigned to each sample.  Violations of compositional invariance can be visualized through the ordering samples by total aligned reads.  Gradients along the diagonal in the heatmap (a), or non-zero slopes (b) indicate a violation of CI.</a:t>
-            </a:r>
-          </a:p>
-        </p:txBody>
-      </p:sp>
-      <p:sp>
-        <p:nvSpPr>
-          <p:cNvPr id="8" name="TextBox 7">
-            <a:extLst>
-              <a:ext uri="{FF2B5EF4-FFF2-40B4-BE49-F238E27FC236}">
-                <a16:creationId xmlns:a16="http://schemas.microsoft.com/office/drawing/2014/main" id="{896DB140-5264-4CF5-A835-A7D292B9A190}"/>
-              </a:ext>
-            </a:extLst>
-          </p:cNvPr>
-          <p:cNvSpPr txBox="1"/>
-          <p:nvPr/>
-        </p:nvSpPr>
-        <p:spPr>
-          <a:xfrm>
-            <a:off x="15024330" y="18328943"/>
-            <a:ext cx="12121067" cy="6186309"/>
-          </a:xfrm>
-          <a:prstGeom prst="rect">
-            <a:avLst/>
-          </a:prstGeom>
-          <a:noFill/>
-        </p:spPr>
-        <p:txBody>
-          <a:bodyPr wrap="square" rtlCol="0">
-            <a:spAutoFit/>
-          </a:bodyPr>
-          <a:lstStyle/>
-          <a:p>
-            <a:r>
-              <a:rPr lang="en-US" sz="3600" dirty="0"/>
-              <a:t>Identifying and controlling for batch effects is a critical step in the transition of RNA-</a:t>
-            </a:r>
-            <a:r>
-              <a:rPr lang="en-US" sz="3600" dirty="0" err="1"/>
-              <a:t>Seq</a:t>
-            </a:r>
-            <a:r>
-              <a:rPr lang="en-US" sz="3600" dirty="0"/>
-              <a:t> from the lab to the clinic. </a:t>
-            </a:r>
-          </a:p>
-          <a:p>
-            <a:pPr marL="457200" indent="-457200">
-              <a:buFont typeface="Arial" panose="020B0604020202020204" pitchFamily="34" charset="0"/>
-              <a:buChar char="•"/>
-            </a:pPr>
-            <a:r>
-              <a:rPr lang="en-US" sz="3600" dirty="0"/>
-              <a:t>Identify sample groups related to batch with a hierarchical clustering (HC) or principal components analysis (PCA) on CLR transformed counts.</a:t>
-            </a:r>
-          </a:p>
-          <a:p>
-            <a:pPr marL="457200" indent="-457200">
-              <a:buFont typeface="Arial" panose="020B0604020202020204" pitchFamily="34" charset="0"/>
-              <a:buChar char="•"/>
-            </a:pPr>
-            <a:r>
-              <a:rPr lang="en-US" sz="3600" dirty="0"/>
-              <a:t>CLR transformation has several benefits:</a:t>
-            </a:r>
-          </a:p>
-          <a:p>
-            <a:pPr marL="914400" lvl="1" indent="-457200">
-              <a:buFont typeface="Arial" panose="020B0604020202020204" pitchFamily="34" charset="0"/>
-              <a:buChar char="•"/>
-            </a:pPr>
-            <a:r>
-              <a:rPr lang="en-US" sz="3600" dirty="0"/>
-              <a:t>Double centering transformation improves PCA biplot interpretation</a:t>
-            </a:r>
-          </a:p>
-          <a:p>
-            <a:pPr marL="914400" lvl="1" indent="-457200">
-              <a:buFont typeface="Arial" panose="020B0604020202020204" pitchFamily="34" charset="0"/>
-              <a:buChar char="•"/>
-            </a:pPr>
-            <a:r>
-              <a:rPr lang="en-US" sz="3600" dirty="0"/>
-              <a:t>Works as single sample normalization without biological assumptions about differential expression among samples</a:t>
-            </a:r>
-          </a:p>
-          <a:p>
-            <a:pPr marL="914400" lvl="1" indent="-457200">
-              <a:buFont typeface="Arial" panose="020B0604020202020204" pitchFamily="34" charset="0"/>
-              <a:buChar char="•"/>
-            </a:pPr>
-            <a:endParaRPr lang="en-US" sz="3600" dirty="0"/>
-          </a:p>
-        </p:txBody>
-      </p:sp>
-      <p:pic>
-        <p:nvPicPr>
-          <p:cNvPr id="9" name="Picture 8">
-            <a:extLst>
-              <a:ext uri="{FF2B5EF4-FFF2-40B4-BE49-F238E27FC236}">
-                <a16:creationId xmlns:a16="http://schemas.microsoft.com/office/drawing/2014/main" id="{6FE30BDE-4E91-40AC-A787-C26BEF577DF4}"/>
               </a:ext>
             </a:extLst>
           </p:cNvPr>
@@ -5253,7 +5510,168 @@
         </p:blipFill>
         <p:spPr>
           <a:xfrm>
-            <a:off x="19431000" y="24063900"/>
+            <a:off x="937409" y="24364036"/>
+            <a:ext cx="4396591" cy="4396591"/>
+          </a:xfrm>
+          <a:prstGeom prst="rect">
+            <a:avLst/>
+          </a:prstGeom>
+        </p:spPr>
+      </p:pic>
+      <p:sp>
+        <p:nvSpPr>
+          <p:cNvPr id="7" name="TextBox 6">
+            <a:extLst>
+              <a:ext uri="{FF2B5EF4-FFF2-40B4-BE49-F238E27FC236}">
+                <a16:creationId xmlns:a16="http://schemas.microsoft.com/office/drawing/2014/main" id="{33ACBAC5-6B78-49ED-AABA-43E3A235C19F}"/>
+              </a:ext>
+            </a:extLst>
+          </p:cNvPr>
+          <p:cNvSpPr txBox="1"/>
+          <p:nvPr/>
+        </p:nvSpPr>
+        <p:spPr>
+          <a:xfrm flipH="1">
+            <a:off x="5724211" y="24591836"/>
+            <a:ext cx="7296776" cy="3108543"/>
+          </a:xfrm>
+          <a:prstGeom prst="rect">
+            <a:avLst/>
+          </a:prstGeom>
+          <a:noFill/>
+        </p:spPr>
+        <p:txBody>
+          <a:bodyPr wrap="square" rtlCol="0">
+            <a:spAutoFit/>
+          </a:bodyPr>
+          <a:lstStyle/>
+          <a:p>
+            <a:r>
+              <a:rPr lang="en-US" sz="2800" dirty="0"/>
+              <a:t>Figure 2. Distances between samples should be independent of the total reads assigned to each sample.  Violations of compositional invariance can be visualized through the ordering samples by total aligned reads.  Gradients along the diagonal in the heatmap (a), or non-zero slopes (b) indicate a violation of CI.</a:t>
+            </a:r>
+          </a:p>
+        </p:txBody>
+      </p:sp>
+      <p:sp>
+        <p:nvSpPr>
+          <p:cNvPr id="8" name="TextBox 7">
+            <a:extLst>
+              <a:ext uri="{FF2B5EF4-FFF2-40B4-BE49-F238E27FC236}">
+                <a16:creationId xmlns:a16="http://schemas.microsoft.com/office/drawing/2014/main" id="{896DB140-5264-4CF5-A835-A7D292B9A190}"/>
+              </a:ext>
+            </a:extLst>
+          </p:cNvPr>
+          <p:cNvSpPr txBox="1"/>
+          <p:nvPr/>
+        </p:nvSpPr>
+        <p:spPr>
+          <a:xfrm>
+            <a:off x="15024330" y="18328943"/>
+            <a:ext cx="12121067" cy="6186309"/>
+          </a:xfrm>
+          <a:prstGeom prst="rect">
+            <a:avLst/>
+          </a:prstGeom>
+          <a:noFill/>
+        </p:spPr>
+        <p:txBody>
+          <a:bodyPr wrap="square" rtlCol="0">
+            <a:spAutoFit/>
+          </a:bodyPr>
+          <a:lstStyle/>
+          <a:p>
+            <a:r>
+              <a:rPr lang="en-US" sz="3600" dirty="0"/>
+              <a:t>Identifying and controlling for batch effects is a critical step in the transition of RNA-</a:t>
+            </a:r>
+            <a:r>
+              <a:rPr lang="en-US" sz="3600" dirty="0" err="1"/>
+              <a:t>Seq</a:t>
+            </a:r>
+            <a:r>
+              <a:rPr lang="en-US" sz="3600" dirty="0"/>
+              <a:t> from the lab to the clinic. </a:t>
+            </a:r>
+          </a:p>
+          <a:p>
+            <a:pPr marL="457200" indent="-457200">
+              <a:buFont typeface="Arial" panose="020B0604020202020204" pitchFamily="34" charset="0"/>
+              <a:buChar char="•"/>
+            </a:pPr>
+            <a:r>
+              <a:rPr lang="en-US" sz="3600" dirty="0"/>
+              <a:t>Identify sample groups related to batch with a hierarchical clustering (HC) or principal components analysis (PCA) on CLR transformed counts.</a:t>
+            </a:r>
+          </a:p>
+          <a:p>
+            <a:pPr marL="457200" indent="-457200">
+              <a:buFont typeface="Arial" panose="020B0604020202020204" pitchFamily="34" charset="0"/>
+              <a:buChar char="•"/>
+            </a:pPr>
+            <a:r>
+              <a:rPr lang="en-US" sz="3600" dirty="0"/>
+              <a:t>CLR transformation has several benefits:</a:t>
+            </a:r>
+          </a:p>
+          <a:p>
+            <a:pPr marL="914400" lvl="1" indent="-457200">
+              <a:buFont typeface="Arial" panose="020B0604020202020204" pitchFamily="34" charset="0"/>
+              <a:buChar char="•"/>
+            </a:pPr>
+            <a:r>
+              <a:rPr lang="en-US" sz="3600" dirty="0"/>
+              <a:t>Double centering transformation improves PCA biplot interpretation</a:t>
+            </a:r>
+          </a:p>
+          <a:p>
+            <a:pPr marL="914400" lvl="1" indent="-457200">
+              <a:buFont typeface="Arial" panose="020B0604020202020204" pitchFamily="34" charset="0"/>
+              <a:buChar char="•"/>
+            </a:pPr>
+            <a:r>
+              <a:rPr lang="en-US" sz="3600" dirty="0"/>
+              <a:t>Works as single sample normalization without biological assumptions about differential expression among samples</a:t>
+            </a:r>
+          </a:p>
+          <a:p>
+            <a:pPr marL="914400" lvl="1" indent="-457200">
+              <a:buFont typeface="Arial" panose="020B0604020202020204" pitchFamily="34" charset="0"/>
+              <a:buChar char="•"/>
+            </a:pPr>
+            <a:endParaRPr lang="en-US" sz="3600" dirty="0"/>
+          </a:p>
+        </p:txBody>
+      </p:sp>
+      <p:pic>
+        <p:nvPicPr>
+          <p:cNvPr id="9" name="Picture 8">
+            <a:extLst>
+              <a:ext uri="{FF2B5EF4-FFF2-40B4-BE49-F238E27FC236}">
+                <a16:creationId xmlns:a16="http://schemas.microsoft.com/office/drawing/2014/main" id="{6FE30BDE-4E91-40AC-A787-C26BEF577DF4}"/>
+              </a:ext>
+            </a:extLst>
+          </p:cNvPr>
+          <p:cNvPicPr>
+            <a:picLocks noChangeAspect="1"/>
+          </p:cNvPicPr>
+          <p:nvPr/>
+        </p:nvPicPr>
+        <p:blipFill>
+          <a:blip r:embed="rId10">
+            <a:extLst>
+              <a:ext uri="{28A0092B-C50C-407E-A947-70E740481C1C}">
+                <a14:useLocalDpi xmlns:a14="http://schemas.microsoft.com/office/drawing/2010/main" val="0"/>
+              </a:ext>
+            </a:extLst>
+          </a:blip>
+          <a:stretch>
+            <a:fillRect/>
+          </a:stretch>
+        </p:blipFill>
+        <p:spPr>
+          <a:xfrm>
+            <a:off x="19532592" y="24306663"/>
             <a:ext cx="8328834" cy="4164417"/>
           </a:xfrm>
           <a:prstGeom prst="rect">
@@ -5390,16 +5808,13 @@
             </a:pPr>
             <a:r>
               <a:rPr lang="en-US" sz="3600" dirty="0"/>
-              <a:t>Leverage compositional theory to improve RNA-</a:t>
+              <a:t>Leverage compositional theory to improve analytical methods for targeted extraction-free RNA-</a:t>
             </a:r>
             <a:r>
               <a:rPr lang="en-US" sz="3600" dirty="0" err="1"/>
               <a:t>Seq</a:t>
             </a:r>
-            <a:r>
-              <a:rPr lang="en-US" sz="3600" dirty="0"/>
-              <a:t> analytical methods</a:t>
-            </a:r>
+            <a:endParaRPr lang="en-US" sz="3600" dirty="0"/>
           </a:p>
           <a:p>
             <a:r>
@@ -5423,8 +5838,8 @@
         </p:nvSpPr>
         <p:spPr>
           <a:xfrm>
-            <a:off x="727867" y="29238669"/>
-            <a:ext cx="24015523" cy="461665"/>
+            <a:off x="727866" y="29280313"/>
+            <a:ext cx="36411209" cy="584775"/>
           </a:xfrm>
           <a:prstGeom prst="rect">
             <a:avLst/>
@@ -5438,43 +5853,43 @@
           <a:lstStyle/>
           <a:p>
             <a:r>
-              <a:rPr lang="en-US" sz="2400" baseline="30000" dirty="0"/>
+              <a:rPr lang="en-US" sz="3200" baseline="30000" dirty="0"/>
               <a:t>1 </a:t>
             </a:r>
             <a:r>
-              <a:rPr lang="en-US" sz="2400" dirty="0"/>
+              <a:rPr lang="en-US" sz="3200" dirty="0"/>
               <a:t>University of Arizona, Mel and Enid Zuckerman College of Public Health, Department of Biostatistics, </a:t>
             </a:r>
             <a:r>
-              <a:rPr lang="en-US" sz="2400" baseline="30000" dirty="0"/>
+              <a:rPr lang="en-US" sz="3200" baseline="30000" dirty="0"/>
               <a:t>2</a:t>
             </a:r>
             <a:r>
-              <a:rPr lang="en-US" sz="2400" dirty="0"/>
+              <a:rPr lang="en-US" sz="3200" dirty="0"/>
               <a:t>HTG Molecular Diagnostics, </a:t>
             </a:r>
             <a:r>
-              <a:rPr lang="en-US" sz="2400" baseline="30000" dirty="0"/>
+              <a:rPr lang="en-US" sz="3200" baseline="30000" dirty="0"/>
               <a:t>*</a:t>
             </a:r>
             <a:r>
-              <a:rPr lang="en-US" sz="2400" dirty="0"/>
+              <a:rPr lang="en-US" sz="3200" dirty="0"/>
               <a:t>Corresponding Author: </a:t>
             </a:r>
             <a:r>
-              <a:rPr lang="en-US" sz="2400" dirty="0" err="1"/>
+              <a:rPr lang="en-US" sz="3200" dirty="0" err="1"/>
               <a:t>dlaroche@email.arizona</a:t>
             </a:r>
             <a:r>
-              <a:rPr lang="en-US" sz="2400" dirty="0"/>
+              <a:rPr lang="en-US" sz="3200" dirty="0"/>
               <a:t> .</a:t>
             </a:r>
             <a:r>
-              <a:rPr lang="en-US" sz="2400" dirty="0" err="1"/>
+              <a:rPr lang="en-US" sz="3200" dirty="0" err="1"/>
               <a:t>edu</a:t>
             </a:r>
             <a:r>
-              <a:rPr lang="en-US" sz="2400" baseline="30000" dirty="0"/>
+              <a:rPr lang="en-US" sz="3200" baseline="30000" dirty="0"/>
               <a:t> </a:t>
             </a:r>
           </a:p>
@@ -5495,7 +5910,7 @@
           <p:nvPr/>
         </p:nvPicPr>
         <p:blipFill>
-          <a:blip r:embed="rId10" cstate="print">
+          <a:blip r:embed="rId11" cstate="print">
             <a:extLst>
               <a:ext uri="{28A0092B-C50C-407E-A947-70E740481C1C}">
                 <a14:useLocalDpi xmlns:a14="http://schemas.microsoft.com/office/drawing/2010/main" val="0"/>
@@ -5788,4 +6203,299 @@
     </a:ext>
   </a:extLst>
 </a:theme>
+</file>
+
+<file path=ppt/theme/theme2.xml><?xml version="1.0" encoding="utf-8"?>
+<a:theme xmlns:a="http://schemas.openxmlformats.org/drawingml/2006/main" name="Office Theme">
+  <a:themeElements>
+    <a:clrScheme name="Office">
+      <a:dk1>
+        <a:sysClr val="windowText" lastClr="000000"/>
+      </a:dk1>
+      <a:lt1>
+        <a:sysClr val="window" lastClr="FFFFFF"/>
+      </a:lt1>
+      <a:dk2>
+        <a:srgbClr val="44546A"/>
+      </a:dk2>
+      <a:lt2>
+        <a:srgbClr val="E7E6E6"/>
+      </a:lt2>
+      <a:accent1>
+        <a:srgbClr val="4472C4"/>
+      </a:accent1>
+      <a:accent2>
+        <a:srgbClr val="ED7D31"/>
+      </a:accent2>
+      <a:accent3>
+        <a:srgbClr val="A5A5A5"/>
+      </a:accent3>
+      <a:accent4>
+        <a:srgbClr val="FFC000"/>
+      </a:accent4>
+      <a:accent5>
+        <a:srgbClr val="5B9BD5"/>
+      </a:accent5>
+      <a:accent6>
+        <a:srgbClr val="70AD47"/>
+      </a:accent6>
+      <a:hlink>
+        <a:srgbClr val="0563C1"/>
+      </a:hlink>
+      <a:folHlink>
+        <a:srgbClr val="954F72"/>
+      </a:folHlink>
+    </a:clrScheme>
+    <a:fontScheme name="Office">
+      <a:majorFont>
+        <a:latin typeface="Calibri Light" panose="020F0302020204030204"/>
+        <a:ea typeface=""/>
+        <a:cs typeface=""/>
+        <a:font script="Jpan" typeface="游ゴシック Light"/>
+        <a:font script="Hang" typeface="맑은 고딕"/>
+        <a:font script="Hans" typeface="等线 Light"/>
+        <a:font script="Hant" typeface="新細明體"/>
+        <a:font script="Arab" typeface="Times New Roman"/>
+        <a:font script="Hebr" typeface="Times New Roman"/>
+        <a:font script="Thai" typeface="Angsana New"/>
+        <a:font script="Ethi" typeface="Nyala"/>
+        <a:font script="Beng" typeface="Vrinda"/>
+        <a:font script="Gujr" typeface="Shruti"/>
+        <a:font script="Khmr" typeface="MoolBoran"/>
+        <a:font script="Knda" typeface="Tunga"/>
+        <a:font script="Guru" typeface="Raavi"/>
+        <a:font script="Cans" typeface="Euphemia"/>
+        <a:font script="Cher" typeface="Plantagenet Cherokee"/>
+        <a:font script="Yiii" typeface="Microsoft Yi Baiti"/>
+        <a:font script="Tibt" typeface="Microsoft Himalaya"/>
+        <a:font script="Thaa" typeface="MV Boli"/>
+        <a:font script="Deva" typeface="Mangal"/>
+        <a:font script="Telu" typeface="Gautami"/>
+        <a:font script="Taml" typeface="Latha"/>
+        <a:font script="Syrc" typeface="Estrangelo Edessa"/>
+        <a:font script="Orya" typeface="Kalinga"/>
+        <a:font script="Mlym" typeface="Kartika"/>
+        <a:font script="Laoo" typeface="DokChampa"/>
+        <a:font script="Sinh" typeface="Iskoola Pota"/>
+        <a:font script="Mong" typeface="Mongolian Baiti"/>
+        <a:font script="Viet" typeface="Times New Roman"/>
+        <a:font script="Uigh" typeface="Microsoft Uighur"/>
+        <a:font script="Geor" typeface="Sylfaen"/>
+        <a:font script="Armn" typeface="Arial"/>
+        <a:font script="Bugi" typeface="Leelawadee UI"/>
+        <a:font script="Bopo" typeface="Microsoft JhengHei"/>
+        <a:font script="Java" typeface="Javanese Text"/>
+        <a:font script="Lisu" typeface="Segoe UI"/>
+        <a:font script="Mymr" typeface="Myanmar Text"/>
+        <a:font script="Nkoo" typeface="Ebrima"/>
+        <a:font script="Olck" typeface="Nirmala UI"/>
+        <a:font script="Osma" typeface="Ebrima"/>
+        <a:font script="Phag" typeface="Phagspa"/>
+        <a:font script="Syrn" typeface="Estrangelo Edessa"/>
+        <a:font script="Syrj" typeface="Estrangelo Edessa"/>
+        <a:font script="Syre" typeface="Estrangelo Edessa"/>
+        <a:font script="Sora" typeface="Nirmala UI"/>
+        <a:font script="Tale" typeface="Microsoft Tai Le"/>
+        <a:font script="Talu" typeface="Microsoft New Tai Lue"/>
+        <a:font script="Tfng" typeface="Ebrima"/>
+      </a:majorFont>
+      <a:minorFont>
+        <a:latin typeface="Calibri" panose="020F0502020204030204"/>
+        <a:ea typeface=""/>
+        <a:cs typeface=""/>
+        <a:font script="Jpan" typeface="游ゴシック"/>
+        <a:font script="Hang" typeface="맑은 고딕"/>
+        <a:font script="Hans" typeface="等线"/>
+        <a:font script="Hant" typeface="新細明體"/>
+        <a:font script="Arab" typeface="Arial"/>
+        <a:font script="Hebr" typeface="Arial"/>
+        <a:font script="Thai" typeface="Cordia New"/>
+        <a:font script="Ethi" typeface="Nyala"/>
+        <a:font script="Beng" typeface="Vrinda"/>
+        <a:font script="Gujr" typeface="Shruti"/>
+        <a:font script="Khmr" typeface="DaunPenh"/>
+        <a:font script="Knda" typeface="Tunga"/>
+        <a:font script="Guru" typeface="Raavi"/>
+        <a:font script="Cans" typeface="Euphemia"/>
+        <a:font script="Cher" typeface="Plantagenet Cherokee"/>
+        <a:font script="Yiii" typeface="Microsoft Yi Baiti"/>
+        <a:font script="Tibt" typeface="Microsoft Himalaya"/>
+        <a:font script="Thaa" typeface="MV Boli"/>
+        <a:font script="Deva" typeface="Mangal"/>
+        <a:font script="Telu" typeface="Gautami"/>
+        <a:font script="Taml" typeface="Latha"/>
+        <a:font script="Syrc" typeface="Estrangelo Edessa"/>
+        <a:font script="Orya" typeface="Kalinga"/>
+        <a:font script="Mlym" typeface="Kartika"/>
+        <a:font script="Laoo" typeface="DokChampa"/>
+        <a:font script="Sinh" typeface="Iskoola Pota"/>
+        <a:font script="Mong" typeface="Mongolian Baiti"/>
+        <a:font script="Viet" typeface="Arial"/>
+        <a:font script="Uigh" typeface="Microsoft Uighur"/>
+        <a:font script="Geor" typeface="Sylfaen"/>
+        <a:font script="Armn" typeface="Arial"/>
+        <a:font script="Bugi" typeface="Leelawadee UI"/>
+        <a:font script="Bopo" typeface="Microsoft JhengHei"/>
+        <a:font script="Java" typeface="Javanese Text"/>
+        <a:font script="Lisu" typeface="Segoe UI"/>
+        <a:font script="Mymr" typeface="Myanmar Text"/>
+        <a:font script="Nkoo" typeface="Ebrima"/>
+        <a:font script="Olck" typeface="Nirmala UI"/>
+        <a:font script="Osma" typeface="Ebrima"/>
+        <a:font script="Phag" typeface="Phagspa"/>
+        <a:font script="Syrn" typeface="Estrangelo Edessa"/>
+        <a:font script="Syrj" typeface="Estrangelo Edessa"/>
+        <a:font script="Syre" typeface="Estrangelo Edessa"/>
+        <a:font script="Sora" typeface="Nirmala UI"/>
+        <a:font script="Tale" typeface="Microsoft Tai Le"/>
+        <a:font script="Talu" typeface="Microsoft New Tai Lue"/>
+        <a:font script="Tfng" typeface="Ebrima"/>
+      </a:minorFont>
+    </a:fontScheme>
+    <a:fmtScheme name="Office">
+      <a:fillStyleLst>
+        <a:solidFill>
+          <a:schemeClr val="phClr"/>
+        </a:solidFill>
+        <a:gradFill rotWithShape="1">
+          <a:gsLst>
+            <a:gs pos="0">
+              <a:schemeClr val="phClr">
+                <a:lumMod val="110000"/>
+                <a:satMod val="105000"/>
+                <a:tint val="67000"/>
+              </a:schemeClr>
+            </a:gs>
+            <a:gs pos="50000">
+              <a:schemeClr val="phClr">
+                <a:lumMod val="105000"/>
+                <a:satMod val="103000"/>
+                <a:tint val="73000"/>
+              </a:schemeClr>
+            </a:gs>
+            <a:gs pos="100000">
+              <a:schemeClr val="phClr">
+                <a:lumMod val="105000"/>
+                <a:satMod val="109000"/>
+                <a:tint val="81000"/>
+              </a:schemeClr>
+            </a:gs>
+          </a:gsLst>
+          <a:lin ang="5400000" scaled="0"/>
+        </a:gradFill>
+        <a:gradFill rotWithShape="1">
+          <a:gsLst>
+            <a:gs pos="0">
+              <a:schemeClr val="phClr">
+                <a:satMod val="103000"/>
+                <a:lumMod val="102000"/>
+                <a:tint val="94000"/>
+              </a:schemeClr>
+            </a:gs>
+            <a:gs pos="50000">
+              <a:schemeClr val="phClr">
+                <a:satMod val="110000"/>
+                <a:lumMod val="100000"/>
+                <a:shade val="100000"/>
+              </a:schemeClr>
+            </a:gs>
+            <a:gs pos="100000">
+              <a:schemeClr val="phClr">
+                <a:lumMod val="99000"/>
+                <a:satMod val="120000"/>
+                <a:shade val="78000"/>
+              </a:schemeClr>
+            </a:gs>
+          </a:gsLst>
+          <a:lin ang="5400000" scaled="0"/>
+        </a:gradFill>
+      </a:fillStyleLst>
+      <a:lnStyleLst>
+        <a:ln w="6350" cap="flat" cmpd="sng" algn="ctr">
+          <a:solidFill>
+            <a:schemeClr val="phClr"/>
+          </a:solidFill>
+          <a:prstDash val="solid"/>
+          <a:miter lim="800000"/>
+        </a:ln>
+        <a:ln w="12700" cap="flat" cmpd="sng" algn="ctr">
+          <a:solidFill>
+            <a:schemeClr val="phClr"/>
+          </a:solidFill>
+          <a:prstDash val="solid"/>
+          <a:miter lim="800000"/>
+        </a:ln>
+        <a:ln w="19050" cap="flat" cmpd="sng" algn="ctr">
+          <a:solidFill>
+            <a:schemeClr val="phClr"/>
+          </a:solidFill>
+          <a:prstDash val="solid"/>
+          <a:miter lim="800000"/>
+        </a:ln>
+      </a:lnStyleLst>
+      <a:effectStyleLst>
+        <a:effectStyle>
+          <a:effectLst/>
+        </a:effectStyle>
+        <a:effectStyle>
+          <a:effectLst/>
+        </a:effectStyle>
+        <a:effectStyle>
+          <a:effectLst>
+            <a:outerShdw blurRad="57150" dist="19050" dir="5400000" algn="ctr" rotWithShape="0">
+              <a:srgbClr val="000000">
+                <a:alpha val="63000"/>
+              </a:srgbClr>
+            </a:outerShdw>
+          </a:effectLst>
+        </a:effectStyle>
+      </a:effectStyleLst>
+      <a:bgFillStyleLst>
+        <a:solidFill>
+          <a:schemeClr val="phClr"/>
+        </a:solidFill>
+        <a:solidFill>
+          <a:schemeClr val="phClr">
+            <a:tint val="95000"/>
+            <a:satMod val="170000"/>
+          </a:schemeClr>
+        </a:solidFill>
+        <a:gradFill rotWithShape="1">
+          <a:gsLst>
+            <a:gs pos="0">
+              <a:schemeClr val="phClr">
+                <a:tint val="93000"/>
+                <a:satMod val="150000"/>
+                <a:shade val="98000"/>
+                <a:lumMod val="102000"/>
+              </a:schemeClr>
+            </a:gs>
+            <a:gs pos="50000">
+              <a:schemeClr val="phClr">
+                <a:tint val="98000"/>
+                <a:satMod val="130000"/>
+                <a:shade val="90000"/>
+                <a:lumMod val="103000"/>
+              </a:schemeClr>
+            </a:gs>
+            <a:gs pos="100000">
+              <a:schemeClr val="phClr">
+                <a:shade val="63000"/>
+                <a:satMod val="120000"/>
+              </a:schemeClr>
+            </a:gs>
+          </a:gsLst>
+          <a:lin ang="5400000" scaled="0"/>
+        </a:gradFill>
+      </a:bgFillStyleLst>
+    </a:fmtScheme>
+  </a:themeElements>
+  <a:objectDefaults/>
+  <a:extraClrSchemeLst/>
+  <a:extLst>
+    <a:ext uri="{05A4C25C-085E-4340-85A3-A5531E510DB2}">
+      <thm15:themeFamily xmlns:thm15="http://schemas.microsoft.com/office/thememl/2012/main" name="Office Theme" id="{62F939B6-93AF-4DB8-9C6B-D6C7DFDC589F}" vid="{4A3C46E8-61CC-4603-A589-7422A47A8E4A}"/>
+    </a:ext>
+  </a:extLst>
+</a:theme>
 </file>
</xml_diff>

<commit_message>
Final version for printing
</commit_message>
<xml_diff>
--- a/LaRoche_CoDaWork2017_Poster.pptx
+++ b/LaRoche_CoDaWork2017_Poster.pptx
@@ -201,7 +201,7 @@
           <a:p>
             <a:fld id="{FFF02D4F-FC2A-486C-B1E5-31EA62BDB445}" type="datetimeFigureOut">
               <a:rPr lang="en-US" smtClean="0"/>
-              <a:t>5/31/2017</a:t>
+              <a:t>6/1/2017</a:t>
             </a:fld>
             <a:endParaRPr lang="en-US"/>
           </a:p>
@@ -683,7 +683,7 @@
           <a:p>
             <a:fld id="{417B607A-21E1-4CA4-BF44-865E2BD1C4B9}" type="datetimeFigureOut">
               <a:rPr lang="en-US" smtClean="0"/>
-              <a:t>5/31/2017</a:t>
+              <a:t>6/1/2017</a:t>
             </a:fld>
             <a:endParaRPr lang="en-US"/>
           </a:p>
@@ -853,7 +853,7 @@
           <a:p>
             <a:fld id="{417B607A-21E1-4CA4-BF44-865E2BD1C4B9}" type="datetimeFigureOut">
               <a:rPr lang="en-US" smtClean="0"/>
-              <a:t>5/31/2017</a:t>
+              <a:t>6/1/2017</a:t>
             </a:fld>
             <a:endParaRPr lang="en-US"/>
           </a:p>
@@ -1033,7 +1033,7 @@
           <a:p>
             <a:fld id="{417B607A-21E1-4CA4-BF44-865E2BD1C4B9}" type="datetimeFigureOut">
               <a:rPr lang="en-US" smtClean="0"/>
-              <a:t>5/31/2017</a:t>
+              <a:t>6/1/2017</a:t>
             </a:fld>
             <a:endParaRPr lang="en-US"/>
           </a:p>
@@ -1203,7 +1203,7 @@
           <a:p>
             <a:fld id="{417B607A-21E1-4CA4-BF44-865E2BD1C4B9}" type="datetimeFigureOut">
               <a:rPr lang="en-US" smtClean="0"/>
-              <a:t>5/31/2017</a:t>
+              <a:t>6/1/2017</a:t>
             </a:fld>
             <a:endParaRPr lang="en-US"/>
           </a:p>
@@ -1447,7 +1447,7 @@
           <a:p>
             <a:fld id="{417B607A-21E1-4CA4-BF44-865E2BD1C4B9}" type="datetimeFigureOut">
               <a:rPr lang="en-US" smtClean="0"/>
-              <a:t>5/31/2017</a:t>
+              <a:t>6/1/2017</a:t>
             </a:fld>
             <a:endParaRPr lang="en-US"/>
           </a:p>
@@ -1679,7 +1679,7 @@
           <a:p>
             <a:fld id="{417B607A-21E1-4CA4-BF44-865E2BD1C4B9}" type="datetimeFigureOut">
               <a:rPr lang="en-US" smtClean="0"/>
-              <a:t>5/31/2017</a:t>
+              <a:t>6/1/2017</a:t>
             </a:fld>
             <a:endParaRPr lang="en-US"/>
           </a:p>
@@ -2046,7 +2046,7 @@
           <a:p>
             <a:fld id="{417B607A-21E1-4CA4-BF44-865E2BD1C4B9}" type="datetimeFigureOut">
               <a:rPr lang="en-US" smtClean="0"/>
-              <a:t>5/31/2017</a:t>
+              <a:t>6/1/2017</a:t>
             </a:fld>
             <a:endParaRPr lang="en-US"/>
           </a:p>
@@ -2164,7 +2164,7 @@
           <a:p>
             <a:fld id="{417B607A-21E1-4CA4-BF44-865E2BD1C4B9}" type="datetimeFigureOut">
               <a:rPr lang="en-US" smtClean="0"/>
-              <a:t>5/31/2017</a:t>
+              <a:t>6/1/2017</a:t>
             </a:fld>
             <a:endParaRPr lang="en-US"/>
           </a:p>
@@ -2259,7 +2259,7 @@
           <a:p>
             <a:fld id="{417B607A-21E1-4CA4-BF44-865E2BD1C4B9}" type="datetimeFigureOut">
               <a:rPr lang="en-US" smtClean="0"/>
-              <a:t>5/31/2017</a:t>
+              <a:t>6/1/2017</a:t>
             </a:fld>
             <a:endParaRPr lang="en-US"/>
           </a:p>
@@ -2536,7 +2536,7 @@
           <a:p>
             <a:fld id="{417B607A-21E1-4CA4-BF44-865E2BD1C4B9}" type="datetimeFigureOut">
               <a:rPr lang="en-US" smtClean="0"/>
-              <a:t>5/31/2017</a:t>
+              <a:t>6/1/2017</a:t>
             </a:fld>
             <a:endParaRPr lang="en-US"/>
           </a:p>
@@ -2793,7 +2793,7 @@
           <a:p>
             <a:fld id="{417B607A-21E1-4CA4-BF44-865E2BD1C4B9}" type="datetimeFigureOut">
               <a:rPr lang="en-US" smtClean="0"/>
-              <a:t>5/31/2017</a:t>
+              <a:t>6/1/2017</a:t>
             </a:fld>
             <a:endParaRPr lang="en-US"/>
           </a:p>
@@ -3006,7 +3006,7 @@
           <a:p>
             <a:fld id="{417B607A-21E1-4CA4-BF44-865E2BD1C4B9}" type="datetimeFigureOut">
               <a:rPr lang="en-US" smtClean="0"/>
-              <a:t>5/31/2017</a:t>
+              <a:t>6/1/2017</a:t>
             </a:fld>
             <a:endParaRPr lang="en-US"/>
           </a:p>
@@ -4291,8 +4291,8 @@
           </a:p>
         </p:txBody>
       </p:sp>
-      <mc:AlternateContent xmlns:mc="http://schemas.openxmlformats.org/markup-compatibility/2006">
-        <mc:Choice xmlns:a14="http://schemas.microsoft.com/office/drawing/2010/main" Requires="a14">
+      <mc:AlternateContent xmlns:mc="http://schemas.openxmlformats.org/markup-compatibility/2006" xmlns:a14="http://schemas.microsoft.com/office/drawing/2010/main">
+        <mc:Choice Requires="a14">
           <p:sp>
             <p:nvSpPr>
               <p:cNvPr id="26" name="TextBox 25">
@@ -4943,7 +4943,7 @@
             </p:txBody>
           </p:sp>
         </mc:Choice>
-        <mc:Fallback>
+        <mc:Fallback xmlns="">
           <p:sp>
             <p:nvSpPr>
               <p:cNvPr id="26" name="TextBox 25">

</xml_diff>